<commit_message>
Poprawiono prezentację o funkcjach. Dodano przykład porównujący funkcję z procedurą
</commit_message>
<xml_diff>
--- a/Wprowadzenie do funkcji/I. Wprowadzenie do funkcji/Funkcje.pptx
+++ b/Wprowadzenie do funkcji/I. Wprowadzenie do funkcji/Funkcje.pptx
@@ -4,6 +4,9 @@
   <p:sldMasterIdLst>
     <p:sldMasterId id="2147483648" r:id="rId1"/>
   </p:sldMasterIdLst>
+  <p:notesMasterIdLst>
+    <p:notesMasterId r:id="rId16"/>
+  </p:notesMasterIdLst>
   <p:sldIdLst>
     <p:sldId id="256" r:id="rId2"/>
     <p:sldId id="261" r:id="rId3"/>
@@ -14,9 +17,11 @@
     <p:sldId id="268" r:id="rId8"/>
     <p:sldId id="265" r:id="rId9"/>
     <p:sldId id="264" r:id="rId10"/>
-    <p:sldId id="269" r:id="rId11"/>
-    <p:sldId id="270" r:id="rId12"/>
-    <p:sldId id="267" r:id="rId13"/>
+    <p:sldId id="270" r:id="rId11"/>
+    <p:sldId id="269" r:id="rId12"/>
+    <p:sldId id="271" r:id="rId13"/>
+    <p:sldId id="272" r:id="rId14"/>
+    <p:sldId id="267" r:id="rId15"/>
   </p:sldIdLst>
   <p:sldSz cx="12192000" cy="6858000"/>
   <p:notesSz cx="6858000" cy="9144000"/>
@@ -134,8 +139,437 @@
 </p:presentation>
 </file>
 
-<file path=ppt/revisionInfo.xml><?xml version="1.0" encoding="utf-8"?>
-<p1510:revInfo xmlns:a="http://schemas.openxmlformats.org/drawingml/2006/main" xmlns:r="http://schemas.openxmlformats.org/officeDocument/2006/relationships" xmlns:p1510="http://schemas.microsoft.com/office/powerpoint/2015/10/main"/>
+<file path=ppt/notesMasters/notesMaster1.xml><?xml version="1.0" encoding="utf-8"?>
+<p:notesMaster xmlns:a="http://schemas.openxmlformats.org/drawingml/2006/main" xmlns:r="http://schemas.openxmlformats.org/officeDocument/2006/relationships" xmlns:p="http://schemas.openxmlformats.org/presentationml/2006/main">
+  <p:cSld>
+    <p:bg>
+      <p:bgRef idx="1001">
+        <a:schemeClr val="bg1"/>
+      </p:bgRef>
+    </p:bg>
+    <p:spTree>
+      <p:nvGrpSpPr>
+        <p:cNvPr id="1" name=""/>
+        <p:cNvGrpSpPr/>
+        <p:nvPr/>
+      </p:nvGrpSpPr>
+      <p:grpSpPr>
+        <a:xfrm>
+          <a:off x="0" y="0"/>
+          <a:ext cx="0" cy="0"/>
+          <a:chOff x="0" y="0"/>
+          <a:chExt cx="0" cy="0"/>
+        </a:xfrm>
+      </p:grpSpPr>
+      <p:sp>
+        <p:nvSpPr>
+          <p:cNvPr id="2" name="Symbol zastępczy nagłówka 1"/>
+          <p:cNvSpPr>
+            <a:spLocks noGrp="1"/>
+          </p:cNvSpPr>
+          <p:nvPr>
+            <p:ph type="hdr" sz="quarter"/>
+          </p:nvPr>
+        </p:nvSpPr>
+        <p:spPr>
+          <a:xfrm>
+            <a:off x="0" y="0"/>
+            <a:ext cx="2971800" cy="458788"/>
+          </a:xfrm>
+          <a:prstGeom prst="rect">
+            <a:avLst/>
+          </a:prstGeom>
+        </p:spPr>
+        <p:txBody>
+          <a:bodyPr vert="horz" lIns="91440" tIns="45720" rIns="91440" bIns="45720" rtlCol="0"/>
+          <a:lstStyle>
+            <a:lvl1pPr algn="l">
+              <a:defRPr sz="1200"/>
+            </a:lvl1pPr>
+          </a:lstStyle>
+          <a:p>
+            <a:endParaRPr lang="pl-PL"/>
+          </a:p>
+        </p:txBody>
+      </p:sp>
+      <p:sp>
+        <p:nvSpPr>
+          <p:cNvPr id="3" name="Symbol zastępczy daty 2"/>
+          <p:cNvSpPr>
+            <a:spLocks noGrp="1"/>
+          </p:cNvSpPr>
+          <p:nvPr>
+            <p:ph type="dt" idx="1"/>
+          </p:nvPr>
+        </p:nvSpPr>
+        <p:spPr>
+          <a:xfrm>
+            <a:off x="3884613" y="0"/>
+            <a:ext cx="2971800" cy="458788"/>
+          </a:xfrm>
+          <a:prstGeom prst="rect">
+            <a:avLst/>
+          </a:prstGeom>
+        </p:spPr>
+        <p:txBody>
+          <a:bodyPr vert="horz" lIns="91440" tIns="45720" rIns="91440" bIns="45720" rtlCol="0"/>
+          <a:lstStyle>
+            <a:lvl1pPr algn="r">
+              <a:defRPr sz="1200"/>
+            </a:lvl1pPr>
+          </a:lstStyle>
+          <a:p>
+            <a:fld id="{322377C0-A164-8D41-BBC7-A23964C1ECFA}" type="datetimeFigureOut">
+              <a:rPr lang="pl-PL" smtClean="0"/>
+              <a:t>14.06.2018</a:t>
+            </a:fld>
+            <a:endParaRPr lang="pl-PL"/>
+          </a:p>
+        </p:txBody>
+      </p:sp>
+      <p:sp>
+        <p:nvSpPr>
+          <p:cNvPr id="4" name="Symbol zastępczy obrazu slajdu 3"/>
+          <p:cNvSpPr>
+            <a:spLocks noGrp="1" noRot="1" noChangeAspect="1"/>
+          </p:cNvSpPr>
+          <p:nvPr>
+            <p:ph type="sldImg" idx="2"/>
+          </p:nvPr>
+        </p:nvSpPr>
+        <p:spPr>
+          <a:xfrm>
+            <a:off x="685800" y="1143000"/>
+            <a:ext cx="5486400" cy="3086100"/>
+          </a:xfrm>
+          <a:prstGeom prst="rect">
+            <a:avLst/>
+          </a:prstGeom>
+          <a:noFill/>
+          <a:ln w="12700">
+            <a:solidFill>
+              <a:prstClr val="black"/>
+            </a:solidFill>
+          </a:ln>
+        </p:spPr>
+        <p:txBody>
+          <a:bodyPr vert="horz" lIns="91440" tIns="45720" rIns="91440" bIns="45720" rtlCol="0" anchor="ctr"/>
+          <a:lstStyle/>
+          <a:p>
+            <a:endParaRPr lang="pl-PL"/>
+          </a:p>
+        </p:txBody>
+      </p:sp>
+      <p:sp>
+        <p:nvSpPr>
+          <p:cNvPr id="5" name="Symbol zastępczy notatek 4"/>
+          <p:cNvSpPr>
+            <a:spLocks noGrp="1"/>
+          </p:cNvSpPr>
+          <p:nvPr>
+            <p:ph type="body" sz="quarter" idx="3"/>
+          </p:nvPr>
+        </p:nvSpPr>
+        <p:spPr>
+          <a:xfrm>
+            <a:off x="685800" y="4400550"/>
+            <a:ext cx="5486400" cy="3600450"/>
+          </a:xfrm>
+          <a:prstGeom prst="rect">
+            <a:avLst/>
+          </a:prstGeom>
+        </p:spPr>
+        <p:txBody>
+          <a:bodyPr vert="horz" lIns="91440" tIns="45720" rIns="91440" bIns="45720" rtlCol="0"/>
+          <a:lstStyle/>
+          <a:p>
+            <a:pPr lvl="0"/>
+            <a:r>
+              <a:rPr lang="pl-PL"/>
+              <a:t>Edytuj style wzorca tekstu</a:t>
+            </a:r>
+          </a:p>
+          <a:p>
+            <a:pPr lvl="1"/>
+            <a:r>
+              <a:rPr lang="pl-PL"/>
+              <a:t>Drugi poziom</a:t>
+            </a:r>
+          </a:p>
+          <a:p>
+            <a:pPr lvl="2"/>
+            <a:r>
+              <a:rPr lang="pl-PL"/>
+              <a:t>Trzeci poziom</a:t>
+            </a:r>
+          </a:p>
+          <a:p>
+            <a:pPr lvl="3"/>
+            <a:r>
+              <a:rPr lang="pl-PL"/>
+              <a:t>Czwarty poziom</a:t>
+            </a:r>
+          </a:p>
+          <a:p>
+            <a:pPr lvl="4"/>
+            <a:r>
+              <a:rPr lang="pl-PL"/>
+              <a:t>Piąty poziom</a:t>
+            </a:r>
+          </a:p>
+        </p:txBody>
+      </p:sp>
+      <p:sp>
+        <p:nvSpPr>
+          <p:cNvPr id="6" name="Symbol zastępczy stopki 5"/>
+          <p:cNvSpPr>
+            <a:spLocks noGrp="1"/>
+          </p:cNvSpPr>
+          <p:nvPr>
+            <p:ph type="ftr" sz="quarter" idx="4"/>
+          </p:nvPr>
+        </p:nvSpPr>
+        <p:spPr>
+          <a:xfrm>
+            <a:off x="0" y="8685213"/>
+            <a:ext cx="2971800" cy="458787"/>
+          </a:xfrm>
+          <a:prstGeom prst="rect">
+            <a:avLst/>
+          </a:prstGeom>
+        </p:spPr>
+        <p:txBody>
+          <a:bodyPr vert="horz" lIns="91440" tIns="45720" rIns="91440" bIns="45720" rtlCol="0" anchor="b"/>
+          <a:lstStyle>
+            <a:lvl1pPr algn="l">
+              <a:defRPr sz="1200"/>
+            </a:lvl1pPr>
+          </a:lstStyle>
+          <a:p>
+            <a:endParaRPr lang="pl-PL"/>
+          </a:p>
+        </p:txBody>
+      </p:sp>
+      <p:sp>
+        <p:nvSpPr>
+          <p:cNvPr id="7" name="Symbol zastępczy numeru slajdu 6"/>
+          <p:cNvSpPr>
+            <a:spLocks noGrp="1"/>
+          </p:cNvSpPr>
+          <p:nvPr>
+            <p:ph type="sldNum" sz="quarter" idx="5"/>
+          </p:nvPr>
+        </p:nvSpPr>
+        <p:spPr>
+          <a:xfrm>
+            <a:off x="3884613" y="8685213"/>
+            <a:ext cx="2971800" cy="458787"/>
+          </a:xfrm>
+          <a:prstGeom prst="rect">
+            <a:avLst/>
+          </a:prstGeom>
+        </p:spPr>
+        <p:txBody>
+          <a:bodyPr vert="horz" lIns="91440" tIns="45720" rIns="91440" bIns="45720" rtlCol="0" anchor="b"/>
+          <a:lstStyle>
+            <a:lvl1pPr algn="r">
+              <a:defRPr sz="1200"/>
+            </a:lvl1pPr>
+          </a:lstStyle>
+          <a:p>
+            <a:fld id="{3B74BC4B-68D2-D045-B40C-9F6F38B122F3}" type="slidenum">
+              <a:rPr lang="pl-PL" smtClean="0"/>
+              <a:t>‹#›</a:t>
+            </a:fld>
+            <a:endParaRPr lang="pl-PL"/>
+          </a:p>
+        </p:txBody>
+      </p:sp>
+    </p:spTree>
+    <p:extLst>
+      <p:ext uri="{BB962C8B-B14F-4D97-AF65-F5344CB8AC3E}">
+        <p14:creationId xmlns:p14="http://schemas.microsoft.com/office/powerpoint/2010/main" val="1566697341"/>
+      </p:ext>
+    </p:extLst>
+  </p:cSld>
+  <p:clrMap bg1="lt1" tx1="dk1" bg2="lt2" tx2="dk2" accent1="accent1" accent2="accent2" accent3="accent3" accent4="accent4" accent5="accent5" accent6="accent6" hlink="hlink" folHlink="folHlink"/>
+  <p:notesStyle>
+    <a:lvl1pPr marL="0" algn="l" defTabSz="914400" rtl="0" eaLnBrk="1" latinLnBrk="0" hangingPunct="1">
+      <a:defRPr sz="1200" kern="1200">
+        <a:solidFill>
+          <a:schemeClr val="tx1"/>
+        </a:solidFill>
+        <a:latin typeface="+mn-lt"/>
+        <a:ea typeface="+mn-ea"/>
+        <a:cs typeface="+mn-cs"/>
+      </a:defRPr>
+    </a:lvl1pPr>
+    <a:lvl2pPr marL="457200" algn="l" defTabSz="914400" rtl="0" eaLnBrk="1" latinLnBrk="0" hangingPunct="1">
+      <a:defRPr sz="1200" kern="1200">
+        <a:solidFill>
+          <a:schemeClr val="tx1"/>
+        </a:solidFill>
+        <a:latin typeface="+mn-lt"/>
+        <a:ea typeface="+mn-ea"/>
+        <a:cs typeface="+mn-cs"/>
+      </a:defRPr>
+    </a:lvl2pPr>
+    <a:lvl3pPr marL="914400" algn="l" defTabSz="914400" rtl="0" eaLnBrk="1" latinLnBrk="0" hangingPunct="1">
+      <a:defRPr sz="1200" kern="1200">
+        <a:solidFill>
+          <a:schemeClr val="tx1"/>
+        </a:solidFill>
+        <a:latin typeface="+mn-lt"/>
+        <a:ea typeface="+mn-ea"/>
+        <a:cs typeface="+mn-cs"/>
+      </a:defRPr>
+    </a:lvl3pPr>
+    <a:lvl4pPr marL="1371600" algn="l" defTabSz="914400" rtl="0" eaLnBrk="1" latinLnBrk="0" hangingPunct="1">
+      <a:defRPr sz="1200" kern="1200">
+        <a:solidFill>
+          <a:schemeClr val="tx1"/>
+        </a:solidFill>
+        <a:latin typeface="+mn-lt"/>
+        <a:ea typeface="+mn-ea"/>
+        <a:cs typeface="+mn-cs"/>
+      </a:defRPr>
+    </a:lvl4pPr>
+    <a:lvl5pPr marL="1828800" algn="l" defTabSz="914400" rtl="0" eaLnBrk="1" latinLnBrk="0" hangingPunct="1">
+      <a:defRPr sz="1200" kern="1200">
+        <a:solidFill>
+          <a:schemeClr val="tx1"/>
+        </a:solidFill>
+        <a:latin typeface="+mn-lt"/>
+        <a:ea typeface="+mn-ea"/>
+        <a:cs typeface="+mn-cs"/>
+      </a:defRPr>
+    </a:lvl5pPr>
+    <a:lvl6pPr marL="2286000" algn="l" defTabSz="914400" rtl="0" eaLnBrk="1" latinLnBrk="0" hangingPunct="1">
+      <a:defRPr sz="1200" kern="1200">
+        <a:solidFill>
+          <a:schemeClr val="tx1"/>
+        </a:solidFill>
+        <a:latin typeface="+mn-lt"/>
+        <a:ea typeface="+mn-ea"/>
+        <a:cs typeface="+mn-cs"/>
+      </a:defRPr>
+    </a:lvl6pPr>
+    <a:lvl7pPr marL="2743200" algn="l" defTabSz="914400" rtl="0" eaLnBrk="1" latinLnBrk="0" hangingPunct="1">
+      <a:defRPr sz="1200" kern="1200">
+        <a:solidFill>
+          <a:schemeClr val="tx1"/>
+        </a:solidFill>
+        <a:latin typeface="+mn-lt"/>
+        <a:ea typeface="+mn-ea"/>
+        <a:cs typeface="+mn-cs"/>
+      </a:defRPr>
+    </a:lvl7pPr>
+    <a:lvl8pPr marL="3200400" algn="l" defTabSz="914400" rtl="0" eaLnBrk="1" latinLnBrk="0" hangingPunct="1">
+      <a:defRPr sz="1200" kern="1200">
+        <a:solidFill>
+          <a:schemeClr val="tx1"/>
+        </a:solidFill>
+        <a:latin typeface="+mn-lt"/>
+        <a:ea typeface="+mn-ea"/>
+        <a:cs typeface="+mn-cs"/>
+      </a:defRPr>
+    </a:lvl8pPr>
+    <a:lvl9pPr marL="3657600" algn="l" defTabSz="914400" rtl="0" eaLnBrk="1" latinLnBrk="0" hangingPunct="1">
+      <a:defRPr sz="1200" kern="1200">
+        <a:solidFill>
+          <a:schemeClr val="tx1"/>
+        </a:solidFill>
+        <a:latin typeface="+mn-lt"/>
+        <a:ea typeface="+mn-ea"/>
+        <a:cs typeface="+mn-cs"/>
+      </a:defRPr>
+    </a:lvl9pPr>
+  </p:notesStyle>
+</p:notesMaster>
+</file>
+
+<file path=ppt/notesSlides/notesSlide1.xml><?xml version="1.0" encoding="utf-8"?>
+<p:notes xmlns:a="http://schemas.openxmlformats.org/drawingml/2006/main" xmlns:r="http://schemas.openxmlformats.org/officeDocument/2006/relationships" xmlns:p="http://schemas.openxmlformats.org/presentationml/2006/main">
+  <p:cSld>
+    <p:spTree>
+      <p:nvGrpSpPr>
+        <p:cNvPr id="1" name=""/>
+        <p:cNvGrpSpPr/>
+        <p:nvPr/>
+      </p:nvGrpSpPr>
+      <p:grpSpPr>
+        <a:xfrm>
+          <a:off x="0" y="0"/>
+          <a:ext cx="0" cy="0"/>
+          <a:chOff x="0" y="0"/>
+          <a:chExt cx="0" cy="0"/>
+        </a:xfrm>
+      </p:grpSpPr>
+      <p:sp>
+        <p:nvSpPr>
+          <p:cNvPr id="2" name="Symbol zastępczy obrazu slajdu 1"/>
+          <p:cNvSpPr>
+            <a:spLocks noGrp="1" noRot="1" noChangeAspect="1"/>
+          </p:cNvSpPr>
+          <p:nvPr>
+            <p:ph type="sldImg"/>
+          </p:nvPr>
+        </p:nvSpPr>
+        <p:spPr/>
+      </p:sp>
+      <p:sp>
+        <p:nvSpPr>
+          <p:cNvPr id="3" name="Symbol zastępczy notatek 2"/>
+          <p:cNvSpPr>
+            <a:spLocks noGrp="1"/>
+          </p:cNvSpPr>
+          <p:nvPr>
+            <p:ph type="body" idx="1"/>
+          </p:nvPr>
+        </p:nvSpPr>
+        <p:spPr/>
+        <p:txBody>
+          <a:bodyPr/>
+          <a:lstStyle/>
+          <a:p>
+            <a:endParaRPr lang="pl-PL" dirty="0"/>
+          </a:p>
+        </p:txBody>
+      </p:sp>
+      <p:sp>
+        <p:nvSpPr>
+          <p:cNvPr id="4" name="Symbol zastępczy numeru slajdu 3"/>
+          <p:cNvSpPr>
+            <a:spLocks noGrp="1"/>
+          </p:cNvSpPr>
+          <p:nvPr>
+            <p:ph type="sldNum" sz="quarter" idx="10"/>
+          </p:nvPr>
+        </p:nvSpPr>
+        <p:spPr/>
+        <p:txBody>
+          <a:bodyPr/>
+          <a:lstStyle/>
+          <a:p>
+            <a:fld id="{3B74BC4B-68D2-D045-B40C-9F6F38B122F3}" type="slidenum">
+              <a:rPr lang="pl-PL" smtClean="0"/>
+              <a:t>10</a:t>
+            </a:fld>
+            <a:endParaRPr lang="pl-PL"/>
+          </a:p>
+        </p:txBody>
+      </p:sp>
+    </p:spTree>
+    <p:extLst>
+      <p:ext uri="{BB962C8B-B14F-4D97-AF65-F5344CB8AC3E}">
+        <p14:creationId xmlns:p14="http://schemas.microsoft.com/office/powerpoint/2010/main" val="334045961"/>
+      </p:ext>
+    </p:extLst>
+  </p:cSld>
+  <p:clrMapOvr>
+    <a:masterClrMapping/>
+  </p:clrMapOvr>
+</p:notes>
 </file>
 
 <file path=ppt/slideLayouts/slideLayout1.xml><?xml version="1.0" encoding="utf-8"?>
@@ -286,7 +720,7 @@
             <a:fld id="{48C97C24-B5A0-4EEB-AF04-DC997EDCD259}" type="datetimeFigureOut">
               <a:rPr lang="pl-PL" smtClean="0"/>
               <a:pPr/>
-              <a:t>17.01.2018</a:t>
+              <a:t>14.06.2018</a:t>
             </a:fld>
             <a:endParaRPr lang="pl-PL"/>
           </a:p>
@@ -486,7 +920,7 @@
             <a:fld id="{48C97C24-B5A0-4EEB-AF04-DC997EDCD259}" type="datetimeFigureOut">
               <a:rPr lang="pl-PL" smtClean="0"/>
               <a:pPr/>
-              <a:t>17.01.2018</a:t>
+              <a:t>14.06.2018</a:t>
             </a:fld>
             <a:endParaRPr lang="pl-PL"/>
           </a:p>
@@ -696,7 +1130,7 @@
             <a:fld id="{48C97C24-B5A0-4EEB-AF04-DC997EDCD259}" type="datetimeFigureOut">
               <a:rPr lang="pl-PL" smtClean="0"/>
               <a:pPr/>
-              <a:t>17.01.2018</a:t>
+              <a:t>14.06.2018</a:t>
             </a:fld>
             <a:endParaRPr lang="pl-PL"/>
           </a:p>
@@ -896,7 +1330,7 @@
             <a:fld id="{48C97C24-B5A0-4EEB-AF04-DC997EDCD259}" type="datetimeFigureOut">
               <a:rPr lang="pl-PL" smtClean="0"/>
               <a:pPr/>
-              <a:t>17.01.2018</a:t>
+              <a:t>14.06.2018</a:t>
             </a:fld>
             <a:endParaRPr lang="pl-PL"/>
           </a:p>
@@ -1173,7 +1607,7 @@
             <a:fld id="{48C97C24-B5A0-4EEB-AF04-DC997EDCD259}" type="datetimeFigureOut">
               <a:rPr lang="pl-PL" smtClean="0"/>
               <a:pPr/>
-              <a:t>17.01.2018</a:t>
+              <a:t>14.06.2018</a:t>
             </a:fld>
             <a:endParaRPr lang="pl-PL"/>
           </a:p>
@@ -1440,7 +1874,7 @@
             <a:fld id="{48C97C24-B5A0-4EEB-AF04-DC997EDCD259}" type="datetimeFigureOut">
               <a:rPr lang="pl-PL" smtClean="0"/>
               <a:pPr/>
-              <a:t>17.01.2018</a:t>
+              <a:t>14.06.2018</a:t>
             </a:fld>
             <a:endParaRPr lang="pl-PL"/>
           </a:p>
@@ -1854,7 +2288,7 @@
             <a:fld id="{48C97C24-B5A0-4EEB-AF04-DC997EDCD259}" type="datetimeFigureOut">
               <a:rPr lang="pl-PL" smtClean="0"/>
               <a:pPr/>
-              <a:t>17.01.2018</a:t>
+              <a:t>14.06.2018</a:t>
             </a:fld>
             <a:endParaRPr lang="pl-PL"/>
           </a:p>
@@ -1997,7 +2431,7 @@
             <a:fld id="{48C97C24-B5A0-4EEB-AF04-DC997EDCD259}" type="datetimeFigureOut">
               <a:rPr lang="pl-PL" smtClean="0"/>
               <a:pPr/>
-              <a:t>17.01.2018</a:t>
+              <a:t>14.06.2018</a:t>
             </a:fld>
             <a:endParaRPr lang="pl-PL"/>
           </a:p>
@@ -2112,7 +2546,7 @@
             <a:fld id="{48C97C24-B5A0-4EEB-AF04-DC997EDCD259}" type="datetimeFigureOut">
               <a:rPr lang="pl-PL" smtClean="0"/>
               <a:pPr/>
-              <a:t>17.01.2018</a:t>
+              <a:t>14.06.2018</a:t>
             </a:fld>
             <a:endParaRPr lang="pl-PL"/>
           </a:p>
@@ -2425,7 +2859,7 @@
             <a:fld id="{48C97C24-B5A0-4EEB-AF04-DC997EDCD259}" type="datetimeFigureOut">
               <a:rPr lang="pl-PL" smtClean="0"/>
               <a:pPr/>
-              <a:t>17.01.2018</a:t>
+              <a:t>14.06.2018</a:t>
             </a:fld>
             <a:endParaRPr lang="pl-PL"/>
           </a:p>
@@ -2715,7 +3149,7 @@
             <a:fld id="{48C97C24-B5A0-4EEB-AF04-DC997EDCD259}" type="datetimeFigureOut">
               <a:rPr lang="pl-PL" smtClean="0"/>
               <a:pPr/>
-              <a:t>17.01.2018</a:t>
+              <a:t>14.06.2018</a:t>
             </a:fld>
             <a:endParaRPr lang="pl-PL"/>
           </a:p>
@@ -2958,7 +3392,7 @@
             <a:fld id="{48C97C24-B5A0-4EEB-AF04-DC997EDCD259}" type="datetimeFigureOut">
               <a:rPr lang="pl-PL" smtClean="0"/>
               <a:pPr/>
-              <a:t>17.01.2018</a:t>
+              <a:t>14.06.2018</a:t>
             </a:fld>
             <a:endParaRPr lang="pl-PL"/>
           </a:p>
@@ -3476,6 +3910,211 @@
           <a:p>
             <a:r>
               <a:rPr lang="pl-PL" dirty="0"/>
+              <a:t>Przykład działania procedury</a:t>
+            </a:r>
+          </a:p>
+        </p:txBody>
+      </p:sp>
+      <p:sp>
+        <p:nvSpPr>
+          <p:cNvPr id="3" name="Symbol zastępczy zawartości 2"/>
+          <p:cNvSpPr>
+            <a:spLocks noGrp="1"/>
+          </p:cNvSpPr>
+          <p:nvPr>
+            <p:ph idx="1"/>
+          </p:nvPr>
+        </p:nvSpPr>
+        <p:spPr/>
+        <p:txBody>
+          <a:bodyPr>
+            <a:normAutofit/>
+          </a:bodyPr>
+          <a:lstStyle/>
+          <a:p>
+            <a:r>
+              <a:rPr lang="pl-PL" sz="3200" dirty="0"/>
+              <a:t>Procedura </a:t>
+            </a:r>
+            <a:r>
+              <a:rPr lang="pl-PL" sz="3200" b="1" dirty="0"/>
+              <a:t>Zmień Formację (</a:t>
+            </a:r>
+            <a:r>
+              <a:rPr lang="pl-PL" sz="3200" b="1" i="1" dirty="0"/>
+              <a:t>formacja samolotów</a:t>
+            </a:r>
+            <a:r>
+              <a:rPr lang="pl-PL" sz="3200" b="1" dirty="0"/>
+              <a:t>)</a:t>
+            </a:r>
+          </a:p>
+          <a:p>
+            <a:r>
+              <a:rPr lang="pl-PL" sz="3200" dirty="0"/>
+              <a:t>Rezultatem działania procedury jest zmiana formacji tych samych samolotów</a:t>
+            </a:r>
+          </a:p>
+          <a:p>
+            <a:r>
+              <a:rPr lang="pl-PL" sz="3200" dirty="0"/>
+              <a:t>Np.: </a:t>
+            </a:r>
+            <a:r>
+              <a:rPr lang="pl-PL" sz="3200" b="1" dirty="0"/>
+              <a:t>Zmień Formację (</a:t>
+            </a:r>
+            <a:r>
+              <a:rPr lang="pl-PL" sz="3200" b="1" i="1" dirty="0" err="1"/>
+              <a:t>Eagle</a:t>
+            </a:r>
+            <a:r>
+              <a:rPr lang="pl-PL" sz="3200" b="1" dirty="0"/>
+              <a:t>):</a:t>
+            </a:r>
+          </a:p>
+        </p:txBody>
+      </p:sp>
+      <p:pic>
+        <p:nvPicPr>
+          <p:cNvPr id="2050" name="Picture 2" descr="H:\KOMPLET - Trudne tematy w najprostszy sposób\Wprowadzenie do funkcji\I. Wprowadzenie do funkcji\formations1.jpg"/>
+          <p:cNvPicPr>
+            <a:picLocks noChangeAspect="1" noChangeArrowheads="1"/>
+          </p:cNvPicPr>
+          <p:nvPr/>
+        </p:nvPicPr>
+        <p:blipFill>
+          <a:blip r:embed="rId3" cstate="print"/>
+          <a:srcRect/>
+          <a:stretch>
+            <a:fillRect/>
+          </a:stretch>
+        </p:blipFill>
+        <p:spPr bwMode="auto">
+          <a:xfrm>
+            <a:off x="2120845" y="3977640"/>
+            <a:ext cx="2336666" cy="1874520"/>
+          </a:xfrm>
+          <a:prstGeom prst="rect">
+            <a:avLst/>
+          </a:prstGeom>
+          <a:noFill/>
+        </p:spPr>
+      </p:pic>
+      <p:pic>
+        <p:nvPicPr>
+          <p:cNvPr id="2051" name="Picture 3" descr="H:\KOMPLET - Trudne tematy w najprostszy sposób\Wprowadzenie do funkcji\I. Wprowadzenie do funkcji\formations2.jpg"/>
+          <p:cNvPicPr>
+            <a:picLocks noChangeAspect="1" noChangeArrowheads="1"/>
+          </p:cNvPicPr>
+          <p:nvPr/>
+        </p:nvPicPr>
+        <p:blipFill>
+          <a:blip r:embed="rId4" cstate="print"/>
+          <a:srcRect/>
+          <a:stretch>
+            <a:fillRect/>
+          </a:stretch>
+        </p:blipFill>
+        <p:spPr bwMode="auto">
+          <a:xfrm>
+            <a:off x="6876010" y="3975464"/>
+            <a:ext cx="2781583" cy="1876695"/>
+          </a:xfrm>
+          <a:prstGeom prst="rect">
+            <a:avLst/>
+          </a:prstGeom>
+          <a:noFill/>
+        </p:spPr>
+      </p:pic>
+      <p:sp>
+        <p:nvSpPr>
+          <p:cNvPr id="6" name="Strzałka: w prawo 11">
+            <a:extLst>
+              <a:ext uri="{FF2B5EF4-FFF2-40B4-BE49-F238E27FC236}">
+                <a16:creationId xmlns:a16="http://schemas.microsoft.com/office/drawing/2014/main" id="{CD7B406B-3248-45BF-BB28-B9D778B85822}"/>
+              </a:ext>
+            </a:extLst>
+          </p:cNvPr>
+          <p:cNvSpPr/>
+          <p:nvPr/>
+        </p:nvSpPr>
+        <p:spPr>
+          <a:xfrm>
+            <a:off x="4752173" y="4699622"/>
+            <a:ext cx="1776925" cy="461665"/>
+          </a:xfrm>
+          <a:prstGeom prst="rightArrow">
+            <a:avLst/>
+          </a:prstGeom>
+        </p:spPr>
+        <p:style>
+          <a:lnRef idx="2">
+            <a:schemeClr val="accent6">
+              <a:shade val="50000"/>
+            </a:schemeClr>
+          </a:lnRef>
+          <a:fillRef idx="1">
+            <a:schemeClr val="accent6"/>
+          </a:fillRef>
+          <a:effectRef idx="0">
+            <a:schemeClr val="accent6"/>
+          </a:effectRef>
+          <a:fontRef idx="minor">
+            <a:schemeClr val="lt1"/>
+          </a:fontRef>
+        </p:style>
+        <p:txBody>
+          <a:bodyPr rtlCol="0" anchor="ctr"/>
+          <a:lstStyle/>
+          <a:p>
+            <a:pPr algn="ctr"/>
+            <a:endParaRPr lang="pl-PL"/>
+          </a:p>
+        </p:txBody>
+      </p:sp>
+    </p:spTree>
+  </p:cSld>
+  <p:clrMapOvr>
+    <a:masterClrMapping/>
+  </p:clrMapOvr>
+</p:sld>
+</file>
+
+<file path=ppt/slides/slide11.xml><?xml version="1.0" encoding="utf-8"?>
+<p:sld xmlns:a="http://schemas.openxmlformats.org/drawingml/2006/main" xmlns:r="http://schemas.openxmlformats.org/officeDocument/2006/relationships" xmlns:p="http://schemas.openxmlformats.org/presentationml/2006/main">
+  <p:cSld>
+    <p:spTree>
+      <p:nvGrpSpPr>
+        <p:cNvPr id="1" name=""/>
+        <p:cNvGrpSpPr/>
+        <p:nvPr/>
+      </p:nvGrpSpPr>
+      <p:grpSpPr>
+        <a:xfrm>
+          <a:off x="0" y="0"/>
+          <a:ext cx="0" cy="0"/>
+          <a:chOff x="0" y="0"/>
+          <a:chExt cx="0" cy="0"/>
+        </a:xfrm>
+      </p:grpSpPr>
+      <p:sp>
+        <p:nvSpPr>
+          <p:cNvPr id="2" name="Tytuł 1"/>
+          <p:cNvSpPr>
+            <a:spLocks noGrp="1"/>
+          </p:cNvSpPr>
+          <p:nvPr>
+            <p:ph type="title"/>
+          </p:nvPr>
+        </p:nvSpPr>
+        <p:spPr/>
+        <p:txBody>
+          <a:bodyPr/>
+          <a:lstStyle/>
+          <a:p>
+            <a:r>
+              <a:rPr lang="pl-PL" dirty="0"/>
               <a:t>Funkcja </a:t>
             </a:r>
             <a:r>
@@ -3897,7 +4536,7 @@
         </p:nvSpPr>
         <p:spPr>
           <a:xfrm>
-            <a:off x="7357872" y="4852600"/>
+            <a:off x="7357872" y="4850445"/>
             <a:ext cx="2573140" cy="769441"/>
           </a:xfrm>
           <a:prstGeom prst="rect">
@@ -3918,8 +4557,8 @@
           </a:p>
         </p:txBody>
       </p:sp>
-      <mc:AlternateContent xmlns:mc="http://schemas.openxmlformats.org/markup-compatibility/2006">
-        <mc:Choice xmlns:am3d="http://schemas.microsoft.com/office/drawing/2017/model3d" Requires="am3d">
+      <mc:AlternateContent xmlns:mc="http://schemas.openxmlformats.org/markup-compatibility/2006" xmlns:am3d="http://schemas.microsoft.com/office/drawing/2017/model3d">
+        <mc:Choice Requires="am3d">
           <p:graphicFrame>
             <p:nvGraphicFramePr>
               <p:cNvPr id="19" name="Symbol zastępczy zawartości 3" descr="Dark Gray Cube">
@@ -4011,7 +4650,7 @@
             </a:graphic>
           </p:graphicFrame>
         </mc:Choice>
-        <mc:Fallback>
+        <mc:Fallback xmlns="">
           <p:pic>
             <p:nvPicPr>
               <p:cNvPr id="19" name="Symbol zastępczy zawartości 3" descr="Dark Gray Cube">
@@ -4027,7 +4666,7 @@
               <p:nvPr/>
             </p:nvPicPr>
             <p:blipFill>
-              <a:blip r:embed="rId5"/>
+              <a:blip r:embed="rId6"/>
               <a:stretch>
                 <a:fillRect/>
               </a:stretch>
@@ -4044,8 +4683,8 @@
           </p:pic>
         </mc:Fallback>
       </mc:AlternateContent>
-      <mc:AlternateContent xmlns:mc="http://schemas.openxmlformats.org/markup-compatibility/2006">
-        <mc:Choice xmlns:am3d="http://schemas.microsoft.com/office/drawing/2017/model3d" Requires="am3d">
+      <mc:AlternateContent xmlns:mc="http://schemas.openxmlformats.org/markup-compatibility/2006" xmlns:am3d="http://schemas.microsoft.com/office/drawing/2017/model3d">
+        <mc:Choice Requires="am3d">
           <p:graphicFrame>
             <p:nvGraphicFramePr>
               <p:cNvPr id="20" name="Symbol zastępczy zawartości 3" descr="Dark Gray Cube">
@@ -4136,7 +4775,7 @@
             </a:graphic>
           </p:graphicFrame>
         </mc:Choice>
-        <mc:Fallback>
+        <mc:Fallback xmlns="">
           <p:pic>
             <p:nvPicPr>
               <p:cNvPr id="20" name="Symbol zastępczy zawartości 3" descr="Dark Gray Cube">
@@ -4152,7 +4791,7 @@
               <p:nvPr/>
             </p:nvPicPr>
             <p:blipFill>
-              <a:blip r:embed="rId5"/>
+              <a:blip r:embed="rId6"/>
               <a:stretch>
                 <a:fillRect/>
               </a:stretch>
@@ -4169,209 +4808,6 @@
           </p:pic>
         </mc:Fallback>
       </mc:AlternateContent>
-    </p:spTree>
-  </p:cSld>
-  <p:clrMapOvr>
-    <a:masterClrMapping/>
-  </p:clrMapOvr>
-</p:sld>
-</file>
-
-<file path=ppt/slides/slide11.xml><?xml version="1.0" encoding="utf-8"?>
-<p:sld xmlns:a="http://schemas.openxmlformats.org/drawingml/2006/main" xmlns:r="http://schemas.openxmlformats.org/officeDocument/2006/relationships" xmlns:p="http://schemas.openxmlformats.org/presentationml/2006/main">
-  <p:cSld>
-    <p:spTree>
-      <p:nvGrpSpPr>
-        <p:cNvPr id="1" name=""/>
-        <p:cNvGrpSpPr/>
-        <p:nvPr/>
-      </p:nvGrpSpPr>
-      <p:grpSpPr>
-        <a:xfrm>
-          <a:off x="0" y="0"/>
-          <a:ext cx="0" cy="0"/>
-          <a:chOff x="0" y="0"/>
-          <a:chExt cx="0" cy="0"/>
-        </a:xfrm>
-      </p:grpSpPr>
-      <p:sp>
-        <p:nvSpPr>
-          <p:cNvPr id="2" name="Tytuł 1"/>
-          <p:cNvSpPr>
-            <a:spLocks noGrp="1"/>
-          </p:cNvSpPr>
-          <p:nvPr>
-            <p:ph type="title"/>
-          </p:nvPr>
-        </p:nvSpPr>
-        <p:spPr/>
-        <p:txBody>
-          <a:bodyPr/>
-          <a:lstStyle/>
-          <a:p>
-            <a:r>
-              <a:rPr lang="pl-PL" dirty="0"/>
-              <a:t>Przykład działania procedury</a:t>
-            </a:r>
-          </a:p>
-        </p:txBody>
-      </p:sp>
-      <p:sp>
-        <p:nvSpPr>
-          <p:cNvPr id="3" name="Symbol zastępczy zawartości 2"/>
-          <p:cNvSpPr>
-            <a:spLocks noGrp="1"/>
-          </p:cNvSpPr>
-          <p:nvPr>
-            <p:ph idx="1"/>
-          </p:nvPr>
-        </p:nvSpPr>
-        <p:spPr/>
-        <p:txBody>
-          <a:bodyPr/>
-          <a:lstStyle/>
-          <a:p>
-            <a:r>
-              <a:rPr lang="pl-PL" dirty="0"/>
-              <a:t>Procedura </a:t>
-            </a:r>
-            <a:r>
-              <a:rPr lang="pl-PL" b="1" dirty="0"/>
-              <a:t>Zmień Formację (</a:t>
-            </a:r>
-            <a:r>
-              <a:rPr lang="pl-PL" b="1" i="1" dirty="0"/>
-              <a:t>formacja samolotów</a:t>
-            </a:r>
-            <a:r>
-              <a:rPr lang="pl-PL" b="1" dirty="0"/>
-              <a:t>)</a:t>
-            </a:r>
-          </a:p>
-          <a:p>
-            <a:r>
-              <a:rPr lang="pl-PL" dirty="0"/>
-              <a:t>Rezultatem działania procedury jest zmiana formacji tych samych samolotów</a:t>
-            </a:r>
-          </a:p>
-          <a:p>
-            <a:r>
-              <a:rPr lang="pl-PL" dirty="0"/>
-              <a:t>Np.: </a:t>
-            </a:r>
-            <a:r>
-              <a:rPr lang="pl-PL" b="1" dirty="0"/>
-              <a:t>Zmień Formację (</a:t>
-            </a:r>
-            <a:r>
-              <a:rPr lang="pl-PL" b="1" i="1" dirty="0" err="1"/>
-              <a:t>Eagle</a:t>
-            </a:r>
-            <a:r>
-              <a:rPr lang="pl-PL" b="1" dirty="0"/>
-              <a:t>):</a:t>
-            </a:r>
-          </a:p>
-        </p:txBody>
-      </p:sp>
-      <p:pic>
-        <p:nvPicPr>
-          <p:cNvPr id="2050" name="Picture 2" descr="H:\KOMPLET - Trudne tematy w najprostszy sposób\Wprowadzenie do funkcji\I. Wprowadzenie do funkcji\formations1.jpg"/>
-          <p:cNvPicPr>
-            <a:picLocks noChangeAspect="1" noChangeArrowheads="1"/>
-          </p:cNvPicPr>
-          <p:nvPr/>
-        </p:nvPicPr>
-        <p:blipFill>
-          <a:blip r:embed="rId2" cstate="print"/>
-          <a:srcRect/>
-          <a:stretch>
-            <a:fillRect/>
-          </a:stretch>
-        </p:blipFill>
-        <p:spPr bwMode="auto">
-          <a:xfrm>
-            <a:off x="2884297" y="3977640"/>
-            <a:ext cx="1573213" cy="1262063"/>
-          </a:xfrm>
-          <a:prstGeom prst="rect">
-            <a:avLst/>
-          </a:prstGeom>
-          <a:noFill/>
-        </p:spPr>
-      </p:pic>
-      <p:pic>
-        <p:nvPicPr>
-          <p:cNvPr id="2051" name="Picture 3" descr="H:\KOMPLET - Trudne tematy w najprostszy sposób\Wprowadzenie do funkcji\I. Wprowadzenie do funkcji\formations2.jpg"/>
-          <p:cNvPicPr>
-            <a:picLocks noChangeAspect="1" noChangeArrowheads="1"/>
-          </p:cNvPicPr>
-          <p:nvPr/>
-        </p:nvPicPr>
-        <p:blipFill>
-          <a:blip r:embed="rId3" cstate="print"/>
-          <a:srcRect/>
-          <a:stretch>
-            <a:fillRect/>
-          </a:stretch>
-        </p:blipFill>
-        <p:spPr bwMode="auto">
-          <a:xfrm>
-            <a:off x="6837553" y="4133660"/>
-            <a:ext cx="1517650" cy="1023937"/>
-          </a:xfrm>
-          <a:prstGeom prst="rect">
-            <a:avLst/>
-          </a:prstGeom>
-          <a:noFill/>
-        </p:spPr>
-      </p:pic>
-      <p:sp>
-        <p:nvSpPr>
-          <p:cNvPr id="6" name="Strzałka: w prawo 11">
-            <a:extLst>
-              <a:ext uri="{FF2B5EF4-FFF2-40B4-BE49-F238E27FC236}">
-                <a16:creationId xmlns:a16="http://schemas.microsoft.com/office/drawing/2014/main" id="{CD7B406B-3248-45BF-BB28-B9D778B85822}"/>
-              </a:ext>
-            </a:extLst>
-          </p:cNvPr>
-          <p:cNvSpPr/>
-          <p:nvPr/>
-        </p:nvSpPr>
-        <p:spPr>
-          <a:xfrm>
-            <a:off x="4778298" y="4373050"/>
-            <a:ext cx="1776925" cy="461665"/>
-          </a:xfrm>
-          <a:prstGeom prst="rightArrow">
-            <a:avLst/>
-          </a:prstGeom>
-        </p:spPr>
-        <p:style>
-          <a:lnRef idx="2">
-            <a:schemeClr val="accent6">
-              <a:shade val="50000"/>
-            </a:schemeClr>
-          </a:lnRef>
-          <a:fillRef idx="1">
-            <a:schemeClr val="accent6"/>
-          </a:fillRef>
-          <a:effectRef idx="0">
-            <a:schemeClr val="accent6"/>
-          </a:effectRef>
-          <a:fontRef idx="minor">
-            <a:schemeClr val="lt1"/>
-          </a:fontRef>
-        </p:style>
-        <p:txBody>
-          <a:bodyPr rtlCol="0" anchor="ctr"/>
-          <a:lstStyle/>
-          <a:p>
-            <a:pPr algn="ctr"/>
-            <a:endParaRPr lang="pl-PL"/>
-          </a:p>
-        </p:txBody>
-      </p:sp>
     </p:spTree>
   </p:cSld>
   <p:clrMapOvr>
@@ -4402,6 +4838,482 @@
           <p:cNvPr id="2" name="Tytuł 1">
             <a:extLst>
               <a:ext uri="{FF2B5EF4-FFF2-40B4-BE49-F238E27FC236}">
+                <a16:creationId xmlns:a16="http://schemas.microsoft.com/office/drawing/2014/main" id="{DEF65635-ACD1-5540-8345-CAD81EC279D7}"/>
+              </a:ext>
+            </a:extLst>
+          </p:cNvPr>
+          <p:cNvSpPr>
+            <a:spLocks noGrp="1"/>
+          </p:cNvSpPr>
+          <p:nvPr>
+            <p:ph type="title"/>
+          </p:nvPr>
+        </p:nvSpPr>
+        <p:spPr/>
+        <p:txBody>
+          <a:bodyPr/>
+          <a:lstStyle/>
+          <a:p>
+            <a:r>
+              <a:rPr lang="pl-PL" dirty="0"/>
+              <a:t>Procedura</a:t>
+            </a:r>
+          </a:p>
+        </p:txBody>
+      </p:sp>
+      <p:pic>
+        <p:nvPicPr>
+          <p:cNvPr id="5" name="Symbol zastępczy zawartości 4">
+            <a:extLst>
+              <a:ext uri="{FF2B5EF4-FFF2-40B4-BE49-F238E27FC236}">
+                <a16:creationId xmlns:a16="http://schemas.microsoft.com/office/drawing/2014/main" id="{5767BB80-D6CC-544C-9B86-8D8A8F180111}"/>
+              </a:ext>
+            </a:extLst>
+          </p:cNvPr>
+          <p:cNvPicPr>
+            <a:picLocks noGrp="1" noChangeAspect="1"/>
+          </p:cNvPicPr>
+          <p:nvPr>
+            <p:ph idx="1"/>
+          </p:nvPr>
+        </p:nvPicPr>
+        <p:blipFill>
+          <a:blip r:embed="rId2">
+            <a:extLst>
+              <a:ext uri="{28A0092B-C50C-407E-A947-70E740481C1C}">
+                <a14:useLocalDpi xmlns:a14="http://schemas.microsoft.com/office/drawing/2010/main" val="0"/>
+              </a:ext>
+            </a:extLst>
+          </a:blip>
+          <a:stretch>
+            <a:fillRect/>
+          </a:stretch>
+        </p:blipFill>
+        <p:spPr>
+          <a:xfrm>
+            <a:off x="6855108" y="2349411"/>
+            <a:ext cx="4498692" cy="2530514"/>
+          </a:xfrm>
+        </p:spPr>
+      </p:pic>
+      <p:sp>
+        <p:nvSpPr>
+          <p:cNvPr id="8" name="Strzałka: w prawo 11">
+            <a:extLst>
+              <a:ext uri="{FF2B5EF4-FFF2-40B4-BE49-F238E27FC236}">
+                <a16:creationId xmlns:a16="http://schemas.microsoft.com/office/drawing/2014/main" id="{A2C66165-7369-3E4C-8A94-1E512BD01E33}"/>
+              </a:ext>
+            </a:extLst>
+          </p:cNvPr>
+          <p:cNvSpPr/>
+          <p:nvPr/>
+        </p:nvSpPr>
+        <p:spPr>
+          <a:xfrm>
+            <a:off x="5078183" y="3383835"/>
+            <a:ext cx="1776925" cy="461665"/>
+          </a:xfrm>
+          <a:prstGeom prst="rightArrow">
+            <a:avLst/>
+          </a:prstGeom>
+        </p:spPr>
+        <p:style>
+          <a:lnRef idx="2">
+            <a:schemeClr val="accent6">
+              <a:shade val="50000"/>
+            </a:schemeClr>
+          </a:lnRef>
+          <a:fillRef idx="1">
+            <a:schemeClr val="accent6"/>
+          </a:fillRef>
+          <a:effectRef idx="0">
+            <a:schemeClr val="accent6"/>
+          </a:effectRef>
+          <a:fontRef idx="minor">
+            <a:schemeClr val="lt1"/>
+          </a:fontRef>
+        </p:style>
+        <p:txBody>
+          <a:bodyPr rtlCol="0" anchor="ctr"/>
+          <a:lstStyle/>
+          <a:p>
+            <a:pPr algn="ctr"/>
+            <a:endParaRPr lang="pl-PL" dirty="0"/>
+          </a:p>
+        </p:txBody>
+      </p:sp>
+      <p:pic>
+        <p:nvPicPr>
+          <p:cNvPr id="14" name="Obraz 13">
+            <a:extLst>
+              <a:ext uri="{FF2B5EF4-FFF2-40B4-BE49-F238E27FC236}">
+                <a16:creationId xmlns:a16="http://schemas.microsoft.com/office/drawing/2014/main" id="{7C06355B-82AC-EB49-BCBF-C814BA6942CF}"/>
+              </a:ext>
+            </a:extLst>
+          </p:cNvPr>
+          <p:cNvPicPr>
+            <a:picLocks noChangeAspect="1"/>
+          </p:cNvPicPr>
+          <p:nvPr/>
+        </p:nvPicPr>
+        <p:blipFill>
+          <a:blip r:embed="rId3">
+            <a:extLst>
+              <a:ext uri="{28A0092B-C50C-407E-A947-70E740481C1C}">
+                <a14:useLocalDpi xmlns:a14="http://schemas.microsoft.com/office/drawing/2010/main" val="0"/>
+              </a:ext>
+            </a:extLst>
+          </a:blip>
+          <a:stretch>
+            <a:fillRect/>
+          </a:stretch>
+        </p:blipFill>
+        <p:spPr>
+          <a:xfrm>
+            <a:off x="838200" y="2592022"/>
+            <a:ext cx="3636069" cy="2045289"/>
+          </a:xfrm>
+          <a:prstGeom prst="roundRect">
+            <a:avLst/>
+          </a:prstGeom>
+          <a:effectLst>
+            <a:outerShdw blurRad="50800" dist="38100" dir="2700000" algn="tl" rotWithShape="0">
+              <a:prstClr val="black">
+                <a:alpha val="40000"/>
+              </a:prstClr>
+            </a:outerShdw>
+            <a:softEdge rad="0"/>
+          </a:effectLst>
+        </p:spPr>
+      </p:pic>
+    </p:spTree>
+    <p:extLst>
+      <p:ext uri="{BB962C8B-B14F-4D97-AF65-F5344CB8AC3E}">
+        <p14:creationId xmlns:p14="http://schemas.microsoft.com/office/powerpoint/2010/main" val="2332519986"/>
+      </p:ext>
+    </p:extLst>
+  </p:cSld>
+  <p:clrMapOvr>
+    <a:masterClrMapping/>
+  </p:clrMapOvr>
+</p:sld>
+</file>
+
+<file path=ppt/slides/slide13.xml><?xml version="1.0" encoding="utf-8"?>
+<p:sld xmlns:a="http://schemas.openxmlformats.org/drawingml/2006/main" xmlns:r="http://schemas.openxmlformats.org/officeDocument/2006/relationships" xmlns:p="http://schemas.openxmlformats.org/presentationml/2006/main">
+  <p:cSld>
+    <p:spTree>
+      <p:nvGrpSpPr>
+        <p:cNvPr id="1" name=""/>
+        <p:cNvGrpSpPr/>
+        <p:nvPr/>
+      </p:nvGrpSpPr>
+      <p:grpSpPr>
+        <a:xfrm>
+          <a:off x="0" y="0"/>
+          <a:ext cx="0" cy="0"/>
+          <a:chOff x="0" y="0"/>
+          <a:chExt cx="0" cy="0"/>
+        </a:xfrm>
+      </p:grpSpPr>
+      <p:sp>
+        <p:nvSpPr>
+          <p:cNvPr id="2" name="Tytuł 1">
+            <a:extLst>
+              <a:ext uri="{FF2B5EF4-FFF2-40B4-BE49-F238E27FC236}">
+                <a16:creationId xmlns:a16="http://schemas.microsoft.com/office/drawing/2014/main" id="{DEF65635-ACD1-5540-8345-CAD81EC279D7}"/>
+              </a:ext>
+            </a:extLst>
+          </p:cNvPr>
+          <p:cNvSpPr>
+            <a:spLocks noGrp="1"/>
+          </p:cNvSpPr>
+          <p:nvPr>
+            <p:ph type="title"/>
+          </p:nvPr>
+        </p:nvSpPr>
+        <p:spPr/>
+        <p:txBody>
+          <a:bodyPr/>
+          <a:lstStyle/>
+          <a:p>
+            <a:r>
+              <a:rPr lang="pl-PL" dirty="0"/>
+              <a:t>Funkcja</a:t>
+            </a:r>
+          </a:p>
+        </p:txBody>
+      </p:sp>
+      <p:pic>
+        <p:nvPicPr>
+          <p:cNvPr id="5" name="Symbol zastępczy zawartości 4">
+            <a:extLst>
+              <a:ext uri="{FF2B5EF4-FFF2-40B4-BE49-F238E27FC236}">
+                <a16:creationId xmlns:a16="http://schemas.microsoft.com/office/drawing/2014/main" id="{5767BB80-D6CC-544C-9B86-8D8A8F180111}"/>
+              </a:ext>
+            </a:extLst>
+          </p:cNvPr>
+          <p:cNvPicPr>
+            <a:picLocks noGrp="1" noChangeAspect="1"/>
+          </p:cNvPicPr>
+          <p:nvPr>
+            <p:ph idx="1"/>
+          </p:nvPr>
+        </p:nvPicPr>
+        <p:blipFill>
+          <a:blip r:embed="rId2">
+            <a:extLst>
+              <a:ext uri="{28A0092B-C50C-407E-A947-70E740481C1C}">
+                <a14:useLocalDpi xmlns:a14="http://schemas.microsoft.com/office/drawing/2010/main" val="0"/>
+              </a:ext>
+            </a:extLst>
+          </a:blip>
+          <a:stretch>
+            <a:fillRect/>
+          </a:stretch>
+        </p:blipFill>
+        <p:spPr>
+          <a:xfrm>
+            <a:off x="6855108" y="1690688"/>
+            <a:ext cx="4498692" cy="2530514"/>
+          </a:xfrm>
+        </p:spPr>
+      </p:pic>
+      <p:sp>
+        <p:nvSpPr>
+          <p:cNvPr id="8" name="Strzałka: w prawo 11">
+            <a:extLst>
+              <a:ext uri="{FF2B5EF4-FFF2-40B4-BE49-F238E27FC236}">
+                <a16:creationId xmlns:a16="http://schemas.microsoft.com/office/drawing/2014/main" id="{A2C66165-7369-3E4C-8A94-1E512BD01E33}"/>
+              </a:ext>
+            </a:extLst>
+          </p:cNvPr>
+          <p:cNvSpPr/>
+          <p:nvPr/>
+        </p:nvSpPr>
+        <p:spPr>
+          <a:xfrm>
+            <a:off x="5078183" y="2725112"/>
+            <a:ext cx="1776925" cy="461665"/>
+          </a:xfrm>
+          <a:prstGeom prst="rightArrow">
+            <a:avLst/>
+          </a:prstGeom>
+        </p:spPr>
+        <p:style>
+          <a:lnRef idx="2">
+            <a:schemeClr val="accent6">
+              <a:shade val="50000"/>
+            </a:schemeClr>
+          </a:lnRef>
+          <a:fillRef idx="1">
+            <a:schemeClr val="accent6"/>
+          </a:fillRef>
+          <a:effectRef idx="0">
+            <a:schemeClr val="accent6"/>
+          </a:effectRef>
+          <a:fontRef idx="minor">
+            <a:schemeClr val="lt1"/>
+          </a:fontRef>
+        </p:style>
+        <p:txBody>
+          <a:bodyPr rtlCol="0" anchor="ctr"/>
+          <a:lstStyle/>
+          <a:p>
+            <a:pPr algn="ctr"/>
+            <a:endParaRPr lang="pl-PL" dirty="0"/>
+          </a:p>
+        </p:txBody>
+      </p:sp>
+      <p:pic>
+        <p:nvPicPr>
+          <p:cNvPr id="14" name="Obraz 13">
+            <a:extLst>
+              <a:ext uri="{FF2B5EF4-FFF2-40B4-BE49-F238E27FC236}">
+                <a16:creationId xmlns:a16="http://schemas.microsoft.com/office/drawing/2014/main" id="{7C06355B-82AC-EB49-BCBF-C814BA6942CF}"/>
+              </a:ext>
+            </a:extLst>
+          </p:cNvPr>
+          <p:cNvPicPr>
+            <a:picLocks noChangeAspect="1"/>
+          </p:cNvPicPr>
+          <p:nvPr/>
+        </p:nvPicPr>
+        <p:blipFill>
+          <a:blip r:embed="rId3">
+            <a:extLst>
+              <a:ext uri="{28A0092B-C50C-407E-A947-70E740481C1C}">
+                <a14:useLocalDpi xmlns:a14="http://schemas.microsoft.com/office/drawing/2010/main" val="0"/>
+              </a:ext>
+            </a:extLst>
+          </a:blip>
+          <a:stretch>
+            <a:fillRect/>
+          </a:stretch>
+        </p:blipFill>
+        <p:spPr>
+          <a:xfrm>
+            <a:off x="838200" y="1933299"/>
+            <a:ext cx="3636069" cy="2045289"/>
+          </a:xfrm>
+          <a:prstGeom prst="roundRect">
+            <a:avLst/>
+          </a:prstGeom>
+          <a:effectLst>
+            <a:outerShdw blurRad="50800" dist="38100" dir="2700000" algn="tl" rotWithShape="0">
+              <a:prstClr val="black">
+                <a:alpha val="40000"/>
+              </a:prstClr>
+            </a:outerShdw>
+            <a:softEdge rad="0"/>
+          </a:effectLst>
+        </p:spPr>
+      </p:pic>
+      <p:sp>
+        <p:nvSpPr>
+          <p:cNvPr id="6" name="Strzałka: w prawo 11">
+            <a:extLst>
+              <a:ext uri="{FF2B5EF4-FFF2-40B4-BE49-F238E27FC236}">
+                <a16:creationId xmlns:a16="http://schemas.microsoft.com/office/drawing/2014/main" id="{2036267A-43AF-9B4C-8C93-740E11347DA9}"/>
+              </a:ext>
+            </a:extLst>
+          </p:cNvPr>
+          <p:cNvSpPr/>
+          <p:nvPr/>
+        </p:nvSpPr>
+        <p:spPr>
+          <a:xfrm rot="5400000">
+            <a:off x="8605272" y="4246936"/>
+            <a:ext cx="998361" cy="461665"/>
+          </a:xfrm>
+          <a:prstGeom prst="rightArrow">
+            <a:avLst/>
+          </a:prstGeom>
+        </p:spPr>
+        <p:style>
+          <a:lnRef idx="2">
+            <a:schemeClr val="accent6">
+              <a:shade val="50000"/>
+            </a:schemeClr>
+          </a:lnRef>
+          <a:fillRef idx="1">
+            <a:schemeClr val="accent6"/>
+          </a:fillRef>
+          <a:effectRef idx="0">
+            <a:schemeClr val="accent6"/>
+          </a:effectRef>
+          <a:fontRef idx="minor">
+            <a:schemeClr val="lt1"/>
+          </a:fontRef>
+        </p:style>
+        <p:txBody>
+          <a:bodyPr rtlCol="0" anchor="ctr"/>
+          <a:lstStyle/>
+          <a:p>
+            <a:pPr algn="ctr"/>
+            <a:endParaRPr lang="pl-PL" dirty="0"/>
+          </a:p>
+        </p:txBody>
+      </p:sp>
+      <p:sp>
+        <p:nvSpPr>
+          <p:cNvPr id="3" name="Prostokąt 2">
+            <a:extLst>
+              <a:ext uri="{FF2B5EF4-FFF2-40B4-BE49-F238E27FC236}">
+                <a16:creationId xmlns:a16="http://schemas.microsoft.com/office/drawing/2014/main" id="{E8EBE6C1-33ED-5146-B0D1-9891880804A7}"/>
+              </a:ext>
+            </a:extLst>
+          </p:cNvPr>
+          <p:cNvSpPr/>
+          <p:nvPr/>
+        </p:nvSpPr>
+        <p:spPr>
+          <a:xfrm>
+            <a:off x="7137889" y="5085100"/>
+            <a:ext cx="3933128" cy="923330"/>
+          </a:xfrm>
+          <a:prstGeom prst="rect">
+            <a:avLst/>
+          </a:prstGeom>
+          <a:noFill/>
+        </p:spPr>
+        <p:txBody>
+          <a:bodyPr wrap="none" lIns="91440" tIns="45720" rIns="91440" bIns="45720">
+            <a:spAutoFit/>
+          </a:bodyPr>
+          <a:lstStyle/>
+          <a:p>
+            <a:pPr algn="ctr"/>
+            <a:r>
+              <a:rPr lang="pl-PL" sz="5400" cap="none" spc="0" dirty="0">
+                <a:ln w="0"/>
+                <a:solidFill>
+                  <a:schemeClr val="tx1"/>
+                </a:solidFill>
+                <a:effectLst>
+                  <a:outerShdw blurRad="38100" dist="19050" dir="2700000" algn="tl" rotWithShape="0">
+                    <a:schemeClr val="dk1">
+                      <a:alpha val="40000"/>
+                    </a:schemeClr>
+                  </a:outerShdw>
+                </a:effectLst>
+              </a:rPr>
+              <a:t>Wynik: </a:t>
+            </a:r>
+            <a:r>
+              <a:rPr lang="pl-PL" sz="5400" b="1" cap="none" spc="0" dirty="0">
+                <a:ln w="0"/>
+                <a:solidFill>
+                  <a:schemeClr val="tx1"/>
+                </a:solidFill>
+                <a:effectLst>
+                  <a:outerShdw blurRad="38100" dist="19050" dir="2700000" algn="tl" rotWithShape="0">
+                    <a:schemeClr val="dk1">
+                      <a:alpha val="40000"/>
+                    </a:schemeClr>
+                  </a:outerShdw>
+                </a:effectLst>
+              </a:rPr>
+              <a:t>52,50</a:t>
+            </a:r>
+          </a:p>
+        </p:txBody>
+      </p:sp>
+    </p:spTree>
+    <p:extLst>
+      <p:ext uri="{BB962C8B-B14F-4D97-AF65-F5344CB8AC3E}">
+        <p14:creationId xmlns:p14="http://schemas.microsoft.com/office/powerpoint/2010/main" val="2287551382"/>
+      </p:ext>
+    </p:extLst>
+  </p:cSld>
+  <p:clrMapOvr>
+    <a:masterClrMapping/>
+  </p:clrMapOvr>
+</p:sld>
+</file>
+
+<file path=ppt/slides/slide14.xml><?xml version="1.0" encoding="utf-8"?>
+<p:sld xmlns:a="http://schemas.openxmlformats.org/drawingml/2006/main" xmlns:r="http://schemas.openxmlformats.org/officeDocument/2006/relationships" xmlns:p="http://schemas.openxmlformats.org/presentationml/2006/main">
+  <p:cSld>
+    <p:spTree>
+      <p:nvGrpSpPr>
+        <p:cNvPr id="1" name=""/>
+        <p:cNvGrpSpPr/>
+        <p:nvPr/>
+      </p:nvGrpSpPr>
+      <p:grpSpPr>
+        <a:xfrm>
+          <a:off x="0" y="0"/>
+          <a:ext cx="0" cy="0"/>
+          <a:chOff x="0" y="0"/>
+          <a:chExt cx="0" cy="0"/>
+        </a:xfrm>
+      </p:grpSpPr>
+      <p:sp>
+        <p:nvSpPr>
+          <p:cNvPr id="2" name="Tytuł 1">
+            <a:extLst>
+              <a:ext uri="{FF2B5EF4-FFF2-40B4-BE49-F238E27FC236}">
                 <a16:creationId xmlns:a16="http://schemas.microsoft.com/office/drawing/2014/main" id="{DAB16865-58EC-499E-85E2-A5848433A7FA}"/>
               </a:ext>
             </a:extLst>
@@ -4469,6 +5381,24 @@
                 <a:hlinkClick r:id="rId4"/>
               </a:rPr>
               <a:t>https://www.airforce.gov.au/imgs/formations.jpg</a:t>
+            </a:r>
+            <a:endParaRPr lang="pl-PL" dirty="0"/>
+          </a:p>
+          <a:p>
+            <a:r>
+              <a:rPr lang="pl-PL" dirty="0">
+                <a:hlinkClick r:id="rId5"/>
+              </a:rPr>
+              <a:t>https://pixabay.com/pl/pieni%C4%85dze-monety-waluta-finanse-2936339/</a:t>
+            </a:r>
+            <a:endParaRPr lang="pl-PL" dirty="0"/>
+          </a:p>
+          <a:p>
+            <a:r>
+              <a:rPr lang="pl-PL" dirty="0">
+                <a:hlinkClick r:id="rId6"/>
+              </a:rPr>
+              <a:t>https://pixabay.com/pl/pieni%C4%85dze-bilon-monety-moneta-2953695/</a:t>
             </a:r>
             <a:endParaRPr lang="pl-PL" dirty="0"/>
           </a:p>
@@ -5539,34 +6469,36 @@
         </p:nvSpPr>
         <p:spPr/>
         <p:txBody>
-          <a:bodyPr/>
+          <a:bodyPr>
+            <a:normAutofit/>
+          </a:bodyPr>
           <a:lstStyle/>
           <a:p>
             <a:pPr marL="0" indent="0">
               <a:buNone/>
             </a:pPr>
             <a:r>
-              <a:rPr lang="pl-PL" b="1" dirty="0"/>
+              <a:rPr lang="pl-PL" sz="3200" b="1" dirty="0"/>
               <a:t>Nazwa Funkcji </a:t>
             </a:r>
             <a:r>
-              <a:rPr lang="pl-PL" dirty="0"/>
+              <a:rPr lang="pl-PL" sz="3200" dirty="0"/>
               <a:t>(</a:t>
             </a:r>
             <a:r>
-              <a:rPr lang="pl-PL" i="1" dirty="0"/>
+              <a:rPr lang="pl-PL" sz="3200" i="1" dirty="0"/>
               <a:t>parametr1</a:t>
             </a:r>
             <a:r>
-              <a:rPr lang="pl-PL" dirty="0"/>
+              <a:rPr lang="pl-PL" sz="3200" dirty="0"/>
               <a:t>, </a:t>
             </a:r>
             <a:r>
-              <a:rPr lang="pl-PL" i="1" dirty="0"/>
+              <a:rPr lang="pl-PL" sz="3200" i="1" dirty="0"/>
               <a:t>paramter2</a:t>
             </a:r>
             <a:r>
-              <a:rPr lang="pl-PL" dirty="0"/>
+              <a:rPr lang="pl-PL" sz="3200" dirty="0"/>
               <a:t>, …):</a:t>
             </a:r>
           </a:p>
@@ -5575,7 +6507,7 @@
               <a:buNone/>
             </a:pPr>
             <a:r>
-              <a:rPr lang="pl-PL" dirty="0"/>
+              <a:rPr lang="pl-PL" sz="3200" dirty="0"/>
               <a:t>	Operacja1</a:t>
             </a:r>
           </a:p>
@@ -5584,7 +6516,7 @@
               <a:buNone/>
             </a:pPr>
             <a:r>
-              <a:rPr lang="pl-PL" dirty="0"/>
+              <a:rPr lang="pl-PL" sz="3200" dirty="0"/>
               <a:t>	Operacja2</a:t>
             </a:r>
           </a:p>
@@ -5593,7 +6525,7 @@
               <a:buNone/>
             </a:pPr>
             <a:r>
-              <a:rPr lang="pl-PL" dirty="0"/>
+              <a:rPr lang="pl-PL" sz="3200" dirty="0"/>
               <a:t>	…</a:t>
             </a:r>
           </a:p>
@@ -5602,19 +6534,19 @@
               <a:buNone/>
             </a:pPr>
             <a:r>
-              <a:rPr lang="pl-PL" dirty="0"/>
+              <a:rPr lang="pl-PL" sz="3200" dirty="0"/>
               <a:t>	</a:t>
             </a:r>
             <a:r>
-              <a:rPr lang="pl-PL" b="1" dirty="0"/>
+              <a:rPr lang="pl-PL" sz="3200" b="1" dirty="0"/>
               <a:t>Zwróć</a:t>
             </a:r>
             <a:r>
-              <a:rPr lang="pl-PL" dirty="0"/>
+              <a:rPr lang="pl-PL" sz="3200" dirty="0"/>
               <a:t> </a:t>
             </a:r>
             <a:r>
-              <a:rPr lang="pl-PL" b="1" dirty="0">
+              <a:rPr lang="pl-PL" sz="3200" b="1" dirty="0">
                 <a:solidFill>
                   <a:schemeClr val="accent6"/>
                 </a:solidFill>
@@ -6272,34 +7204,36 @@
         </p:nvSpPr>
         <p:spPr/>
         <p:txBody>
-          <a:bodyPr/>
+          <a:bodyPr>
+            <a:normAutofit/>
+          </a:bodyPr>
           <a:lstStyle/>
           <a:p>
             <a:pPr marL="0" indent="0">
               <a:buNone/>
             </a:pPr>
             <a:r>
-              <a:rPr lang="pl-PL" b="1" dirty="0"/>
+              <a:rPr lang="pl-PL" sz="3200" b="1" dirty="0"/>
               <a:t>Maszyna do kawy </a:t>
             </a:r>
             <a:r>
-              <a:rPr lang="pl-PL" dirty="0"/>
+              <a:rPr lang="pl-PL" sz="3200" dirty="0"/>
               <a:t>(</a:t>
             </a:r>
             <a:r>
-              <a:rPr lang="pl-PL" i="1" dirty="0"/>
+              <a:rPr lang="pl-PL" sz="3200" i="1" dirty="0"/>
               <a:t>kwota</a:t>
             </a:r>
             <a:r>
-              <a:rPr lang="pl-PL" dirty="0"/>
+              <a:rPr lang="pl-PL" sz="3200" dirty="0"/>
               <a:t>, </a:t>
             </a:r>
             <a:r>
-              <a:rPr lang="pl-PL" i="1" dirty="0"/>
+              <a:rPr lang="pl-PL" sz="3200" i="1" dirty="0"/>
               <a:t>wybór</a:t>
             </a:r>
             <a:r>
-              <a:rPr lang="pl-PL" dirty="0"/>
+              <a:rPr lang="pl-PL" sz="3200" dirty="0"/>
               <a:t>):</a:t>
             </a:r>
           </a:p>
@@ -6308,23 +7242,23 @@
               <a:buNone/>
             </a:pPr>
             <a:r>
-              <a:rPr lang="pl-PL" dirty="0"/>
+              <a:rPr lang="pl-PL" sz="3200" dirty="0"/>
               <a:t>	Jeżeli </a:t>
             </a:r>
             <a:r>
-              <a:rPr lang="pl-PL" i="1" dirty="0"/>
+              <a:rPr lang="pl-PL" sz="3200" i="1" dirty="0"/>
               <a:t>wybór</a:t>
             </a:r>
             <a:r>
-              <a:rPr lang="pl-PL" dirty="0"/>
+              <a:rPr lang="pl-PL" sz="3200" dirty="0"/>
               <a:t> = „latte” i </a:t>
             </a:r>
             <a:r>
-              <a:rPr lang="pl-PL" i="1" dirty="0"/>
+              <a:rPr lang="pl-PL" sz="3200" i="1" dirty="0"/>
               <a:t>kwota</a:t>
             </a:r>
             <a:r>
-              <a:rPr lang="pl-PL" dirty="0"/>
+              <a:rPr lang="pl-PL" sz="3200" dirty="0"/>
               <a:t> = 3.0 to:</a:t>
             </a:r>
           </a:p>
@@ -6333,11 +7267,11 @@
               <a:buNone/>
             </a:pPr>
             <a:r>
-              <a:rPr lang="pl-PL" b="1" dirty="0"/>
+              <a:rPr lang="pl-PL" sz="3200" b="1" dirty="0"/>
               <a:t>		Zwróć </a:t>
             </a:r>
             <a:r>
-              <a:rPr lang="pl-PL" b="1" dirty="0">
+              <a:rPr lang="pl-PL" sz="3200" b="1" dirty="0">
                 <a:solidFill>
                   <a:schemeClr val="accent6"/>
                 </a:solidFill>
@@ -6931,4 +7865,299 @@
     </a:ext>
   </a:extLst>
 </a:theme>
+</file>
+
+<file path=ppt/theme/theme2.xml><?xml version="1.0" encoding="utf-8"?>
+<a:theme xmlns:a="http://schemas.openxmlformats.org/drawingml/2006/main" name="Motyw pakietu Office">
+  <a:themeElements>
+    <a:clrScheme name="Pakiet Office">
+      <a:dk1>
+        <a:sysClr val="windowText" lastClr="000000"/>
+      </a:dk1>
+      <a:lt1>
+        <a:sysClr val="window" lastClr="FFFFFF"/>
+      </a:lt1>
+      <a:dk2>
+        <a:srgbClr val="44546A"/>
+      </a:dk2>
+      <a:lt2>
+        <a:srgbClr val="E7E6E6"/>
+      </a:lt2>
+      <a:accent1>
+        <a:srgbClr val="4472C4"/>
+      </a:accent1>
+      <a:accent2>
+        <a:srgbClr val="ED7D31"/>
+      </a:accent2>
+      <a:accent3>
+        <a:srgbClr val="A5A5A5"/>
+      </a:accent3>
+      <a:accent4>
+        <a:srgbClr val="FFC000"/>
+      </a:accent4>
+      <a:accent5>
+        <a:srgbClr val="5B9BD5"/>
+      </a:accent5>
+      <a:accent6>
+        <a:srgbClr val="70AD47"/>
+      </a:accent6>
+      <a:hlink>
+        <a:srgbClr val="0563C1"/>
+      </a:hlink>
+      <a:folHlink>
+        <a:srgbClr val="954F72"/>
+      </a:folHlink>
+    </a:clrScheme>
+    <a:fontScheme name="Pakiet Office">
+      <a:majorFont>
+        <a:latin typeface="Calibri Light" panose="020F0302020204030204"/>
+        <a:ea typeface=""/>
+        <a:cs typeface=""/>
+        <a:font script="Jpan" typeface="游ゴシック Light"/>
+        <a:font script="Hang" typeface="맑은 고딕"/>
+        <a:font script="Hans" typeface="等线 Light"/>
+        <a:font script="Hant" typeface="新細明體"/>
+        <a:font script="Arab" typeface="Times New Roman"/>
+        <a:font script="Hebr" typeface="Times New Roman"/>
+        <a:font script="Thai" typeface="Angsana New"/>
+        <a:font script="Ethi" typeface="Nyala"/>
+        <a:font script="Beng" typeface="Vrinda"/>
+        <a:font script="Gujr" typeface="Shruti"/>
+        <a:font script="Khmr" typeface="MoolBoran"/>
+        <a:font script="Knda" typeface="Tunga"/>
+        <a:font script="Guru" typeface="Raavi"/>
+        <a:font script="Cans" typeface="Euphemia"/>
+        <a:font script="Cher" typeface="Plantagenet Cherokee"/>
+        <a:font script="Yiii" typeface="Microsoft Yi Baiti"/>
+        <a:font script="Tibt" typeface="Microsoft Himalaya"/>
+        <a:font script="Thaa" typeface="MV Boli"/>
+        <a:font script="Deva" typeface="Mangal"/>
+        <a:font script="Telu" typeface="Gautami"/>
+        <a:font script="Taml" typeface="Latha"/>
+        <a:font script="Syrc" typeface="Estrangelo Edessa"/>
+        <a:font script="Orya" typeface="Kalinga"/>
+        <a:font script="Mlym" typeface="Kartika"/>
+        <a:font script="Laoo" typeface="DokChampa"/>
+        <a:font script="Sinh" typeface="Iskoola Pota"/>
+        <a:font script="Mong" typeface="Mongolian Baiti"/>
+        <a:font script="Viet" typeface="Times New Roman"/>
+        <a:font script="Uigh" typeface="Microsoft Uighur"/>
+        <a:font script="Geor" typeface="Sylfaen"/>
+        <a:font script="Armn" typeface="Arial"/>
+        <a:font script="Bugi" typeface="Leelawadee UI"/>
+        <a:font script="Bopo" typeface="Microsoft JhengHei"/>
+        <a:font script="Java" typeface="Javanese Text"/>
+        <a:font script="Lisu" typeface="Segoe UI"/>
+        <a:font script="Mymr" typeface="Myanmar Text"/>
+        <a:font script="Nkoo" typeface="Ebrima"/>
+        <a:font script="Olck" typeface="Nirmala UI"/>
+        <a:font script="Osma" typeface="Ebrima"/>
+        <a:font script="Phag" typeface="Phagspa"/>
+        <a:font script="Syrn" typeface="Estrangelo Edessa"/>
+        <a:font script="Syrj" typeface="Estrangelo Edessa"/>
+        <a:font script="Syre" typeface="Estrangelo Edessa"/>
+        <a:font script="Sora" typeface="Nirmala UI"/>
+        <a:font script="Tale" typeface="Microsoft Tai Le"/>
+        <a:font script="Talu" typeface="Microsoft New Tai Lue"/>
+        <a:font script="Tfng" typeface="Ebrima"/>
+      </a:majorFont>
+      <a:minorFont>
+        <a:latin typeface="Calibri" panose="020F0502020204030204"/>
+        <a:ea typeface=""/>
+        <a:cs typeface=""/>
+        <a:font script="Jpan" typeface="游ゴシック"/>
+        <a:font script="Hang" typeface="맑은 고딕"/>
+        <a:font script="Hans" typeface="等线"/>
+        <a:font script="Hant" typeface="新細明體"/>
+        <a:font script="Arab" typeface="Arial"/>
+        <a:font script="Hebr" typeface="Arial"/>
+        <a:font script="Thai" typeface="Cordia New"/>
+        <a:font script="Ethi" typeface="Nyala"/>
+        <a:font script="Beng" typeface="Vrinda"/>
+        <a:font script="Gujr" typeface="Shruti"/>
+        <a:font script="Khmr" typeface="DaunPenh"/>
+        <a:font script="Knda" typeface="Tunga"/>
+        <a:font script="Guru" typeface="Raavi"/>
+        <a:font script="Cans" typeface="Euphemia"/>
+        <a:font script="Cher" typeface="Plantagenet Cherokee"/>
+        <a:font script="Yiii" typeface="Microsoft Yi Baiti"/>
+        <a:font script="Tibt" typeface="Microsoft Himalaya"/>
+        <a:font script="Thaa" typeface="MV Boli"/>
+        <a:font script="Deva" typeface="Mangal"/>
+        <a:font script="Telu" typeface="Gautami"/>
+        <a:font script="Taml" typeface="Latha"/>
+        <a:font script="Syrc" typeface="Estrangelo Edessa"/>
+        <a:font script="Orya" typeface="Kalinga"/>
+        <a:font script="Mlym" typeface="Kartika"/>
+        <a:font script="Laoo" typeface="DokChampa"/>
+        <a:font script="Sinh" typeface="Iskoola Pota"/>
+        <a:font script="Mong" typeface="Mongolian Baiti"/>
+        <a:font script="Viet" typeface="Arial"/>
+        <a:font script="Uigh" typeface="Microsoft Uighur"/>
+        <a:font script="Geor" typeface="Sylfaen"/>
+        <a:font script="Armn" typeface="Arial"/>
+        <a:font script="Bugi" typeface="Leelawadee UI"/>
+        <a:font script="Bopo" typeface="Microsoft JhengHei"/>
+        <a:font script="Java" typeface="Javanese Text"/>
+        <a:font script="Lisu" typeface="Segoe UI"/>
+        <a:font script="Mymr" typeface="Myanmar Text"/>
+        <a:font script="Nkoo" typeface="Ebrima"/>
+        <a:font script="Olck" typeface="Nirmala UI"/>
+        <a:font script="Osma" typeface="Ebrima"/>
+        <a:font script="Phag" typeface="Phagspa"/>
+        <a:font script="Syrn" typeface="Estrangelo Edessa"/>
+        <a:font script="Syrj" typeface="Estrangelo Edessa"/>
+        <a:font script="Syre" typeface="Estrangelo Edessa"/>
+        <a:font script="Sora" typeface="Nirmala UI"/>
+        <a:font script="Tale" typeface="Microsoft Tai Le"/>
+        <a:font script="Talu" typeface="Microsoft New Tai Lue"/>
+        <a:font script="Tfng" typeface="Ebrima"/>
+      </a:minorFont>
+    </a:fontScheme>
+    <a:fmtScheme name="Pakiet Office">
+      <a:fillStyleLst>
+        <a:solidFill>
+          <a:schemeClr val="phClr"/>
+        </a:solidFill>
+        <a:gradFill rotWithShape="1">
+          <a:gsLst>
+            <a:gs pos="0">
+              <a:schemeClr val="phClr">
+                <a:lumMod val="110000"/>
+                <a:satMod val="105000"/>
+                <a:tint val="67000"/>
+              </a:schemeClr>
+            </a:gs>
+            <a:gs pos="50000">
+              <a:schemeClr val="phClr">
+                <a:lumMod val="105000"/>
+                <a:satMod val="103000"/>
+                <a:tint val="73000"/>
+              </a:schemeClr>
+            </a:gs>
+            <a:gs pos="100000">
+              <a:schemeClr val="phClr">
+                <a:lumMod val="105000"/>
+                <a:satMod val="109000"/>
+                <a:tint val="81000"/>
+              </a:schemeClr>
+            </a:gs>
+          </a:gsLst>
+          <a:lin ang="5400000" scaled="0"/>
+        </a:gradFill>
+        <a:gradFill rotWithShape="1">
+          <a:gsLst>
+            <a:gs pos="0">
+              <a:schemeClr val="phClr">
+                <a:satMod val="103000"/>
+                <a:lumMod val="102000"/>
+                <a:tint val="94000"/>
+              </a:schemeClr>
+            </a:gs>
+            <a:gs pos="50000">
+              <a:schemeClr val="phClr">
+                <a:satMod val="110000"/>
+                <a:lumMod val="100000"/>
+                <a:shade val="100000"/>
+              </a:schemeClr>
+            </a:gs>
+            <a:gs pos="100000">
+              <a:schemeClr val="phClr">
+                <a:lumMod val="99000"/>
+                <a:satMod val="120000"/>
+                <a:shade val="78000"/>
+              </a:schemeClr>
+            </a:gs>
+          </a:gsLst>
+          <a:lin ang="5400000" scaled="0"/>
+        </a:gradFill>
+      </a:fillStyleLst>
+      <a:lnStyleLst>
+        <a:ln w="6350" cap="flat" cmpd="sng" algn="ctr">
+          <a:solidFill>
+            <a:schemeClr val="phClr"/>
+          </a:solidFill>
+          <a:prstDash val="solid"/>
+          <a:miter lim="800000"/>
+        </a:ln>
+        <a:ln w="12700" cap="flat" cmpd="sng" algn="ctr">
+          <a:solidFill>
+            <a:schemeClr val="phClr"/>
+          </a:solidFill>
+          <a:prstDash val="solid"/>
+          <a:miter lim="800000"/>
+        </a:ln>
+        <a:ln w="19050" cap="flat" cmpd="sng" algn="ctr">
+          <a:solidFill>
+            <a:schemeClr val="phClr"/>
+          </a:solidFill>
+          <a:prstDash val="solid"/>
+          <a:miter lim="800000"/>
+        </a:ln>
+      </a:lnStyleLst>
+      <a:effectStyleLst>
+        <a:effectStyle>
+          <a:effectLst/>
+        </a:effectStyle>
+        <a:effectStyle>
+          <a:effectLst/>
+        </a:effectStyle>
+        <a:effectStyle>
+          <a:effectLst>
+            <a:outerShdw blurRad="57150" dist="19050" dir="5400000" algn="ctr" rotWithShape="0">
+              <a:srgbClr val="000000">
+                <a:alpha val="63000"/>
+              </a:srgbClr>
+            </a:outerShdw>
+          </a:effectLst>
+        </a:effectStyle>
+      </a:effectStyleLst>
+      <a:bgFillStyleLst>
+        <a:solidFill>
+          <a:schemeClr val="phClr"/>
+        </a:solidFill>
+        <a:solidFill>
+          <a:schemeClr val="phClr">
+            <a:tint val="95000"/>
+            <a:satMod val="170000"/>
+          </a:schemeClr>
+        </a:solidFill>
+        <a:gradFill rotWithShape="1">
+          <a:gsLst>
+            <a:gs pos="0">
+              <a:schemeClr val="phClr">
+                <a:tint val="93000"/>
+                <a:satMod val="150000"/>
+                <a:shade val="98000"/>
+                <a:lumMod val="102000"/>
+              </a:schemeClr>
+            </a:gs>
+            <a:gs pos="50000">
+              <a:schemeClr val="phClr">
+                <a:tint val="98000"/>
+                <a:satMod val="130000"/>
+                <a:shade val="90000"/>
+                <a:lumMod val="103000"/>
+              </a:schemeClr>
+            </a:gs>
+            <a:gs pos="100000">
+              <a:schemeClr val="phClr">
+                <a:shade val="63000"/>
+                <a:satMod val="120000"/>
+              </a:schemeClr>
+            </a:gs>
+          </a:gsLst>
+          <a:lin ang="5400000" scaled="0"/>
+        </a:gradFill>
+      </a:bgFillStyleLst>
+    </a:fmtScheme>
+  </a:themeElements>
+  <a:objectDefaults/>
+  <a:extraClrSchemeLst/>
+  <a:extLst>
+    <a:ext uri="{05A4C25C-085E-4340-85A3-A5531E510DB2}">
+      <thm15:themeFamily xmlns:thm15="http://schemas.microsoft.com/office/thememl/2012/main" name="Office Theme" id="{62F939B6-93AF-4DB8-9C6B-D6C7DFDC589F}" vid="{4A3C46E8-61CC-4603-A589-7422A47A8E4A}"/>
+    </a:ext>
+  </a:extLst>
+</a:theme>
 </file>
</xml_diff>

<commit_message>
Dodano komentarze do prezentacji wstępnej na temat funkcji
</commit_message>
<xml_diff>
--- a/Wprowadzenie do funkcji/I. Wprowadzenie do funkcji/Funkcje.pptx
+++ b/Wprowadzenie do funkcji/I. Wprowadzenie do funkcji/Funkcje.pptx
@@ -221,7 +221,7 @@
           <a:p>
             <a:fld id="{322377C0-A164-8D41-BBC7-A23964C1ECFA}" type="datetimeFigureOut">
               <a:rPr lang="pl-PL" smtClean="0"/>
-              <a:t>14.06.2018</a:t>
+              <a:t>21.06.2018</a:t>
             </a:fld>
             <a:endParaRPr lang="pl-PL"/>
           </a:p>
@@ -532,7 +532,645 @@
           <a:bodyPr/>
           <a:lstStyle/>
           <a:p>
+            <a:r>
+              <a:rPr lang="pl-PL" dirty="0"/>
+              <a:t>Funkcja to takie czarne pudełko, do którego możemy coś włożyć i coś z niego wypadnie.</a:t>
+            </a:r>
+          </a:p>
+        </p:txBody>
+      </p:sp>
+      <p:sp>
+        <p:nvSpPr>
+          <p:cNvPr id="4" name="Symbol zastępczy numeru slajdu 3"/>
+          <p:cNvSpPr>
+            <a:spLocks noGrp="1"/>
+          </p:cNvSpPr>
+          <p:nvPr>
+            <p:ph type="sldNum" sz="quarter" idx="10"/>
+          </p:nvPr>
+        </p:nvSpPr>
+        <p:spPr/>
+        <p:txBody>
+          <a:bodyPr/>
+          <a:lstStyle/>
+          <a:p>
+            <a:fld id="{3B74BC4B-68D2-D045-B40C-9F6F38B122F3}" type="slidenum">
+              <a:rPr lang="pl-PL" smtClean="0"/>
+              <a:t>2</a:t>
+            </a:fld>
+            <a:endParaRPr lang="pl-PL"/>
+          </a:p>
+        </p:txBody>
+      </p:sp>
+    </p:spTree>
+    <p:extLst>
+      <p:ext uri="{BB962C8B-B14F-4D97-AF65-F5344CB8AC3E}">
+        <p14:creationId xmlns:p14="http://schemas.microsoft.com/office/powerpoint/2010/main" val="2684653248"/>
+      </p:ext>
+    </p:extLst>
+  </p:cSld>
+  <p:clrMapOvr>
+    <a:masterClrMapping/>
+  </p:clrMapOvr>
+</p:notes>
+</file>
+
+<file path=ppt/notesSlides/notesSlide10.xml><?xml version="1.0" encoding="utf-8"?>
+<p:notes xmlns:a="http://schemas.openxmlformats.org/drawingml/2006/main" xmlns:r="http://schemas.openxmlformats.org/officeDocument/2006/relationships" xmlns:p="http://schemas.openxmlformats.org/presentationml/2006/main">
+  <p:cSld>
+    <p:spTree>
+      <p:nvGrpSpPr>
+        <p:cNvPr id="1" name=""/>
+        <p:cNvGrpSpPr/>
+        <p:nvPr/>
+      </p:nvGrpSpPr>
+      <p:grpSpPr>
+        <a:xfrm>
+          <a:off x="0" y="0"/>
+          <a:ext cx="0" cy="0"/>
+          <a:chOff x="0" y="0"/>
+          <a:chExt cx="0" cy="0"/>
+        </a:xfrm>
+      </p:grpSpPr>
+      <p:sp>
+        <p:nvSpPr>
+          <p:cNvPr id="2" name="Symbol zastępczy obrazu slajdu 1"/>
+          <p:cNvSpPr>
+            <a:spLocks noGrp="1" noRot="1" noChangeAspect="1"/>
+          </p:cNvSpPr>
+          <p:nvPr>
+            <p:ph type="sldImg"/>
+          </p:nvPr>
+        </p:nvSpPr>
+        <p:spPr/>
+      </p:sp>
+      <p:sp>
+        <p:nvSpPr>
+          <p:cNvPr id="3" name="Symbol zastępczy notatek 2"/>
+          <p:cNvSpPr>
+            <a:spLocks noGrp="1"/>
+          </p:cNvSpPr>
+          <p:nvPr>
+            <p:ph type="body" idx="1"/>
+          </p:nvPr>
+        </p:nvSpPr>
+        <p:spPr/>
+        <p:txBody>
+          <a:bodyPr/>
+          <a:lstStyle/>
+          <a:p>
+            <a:r>
+              <a:rPr lang="pl-PL" dirty="0"/>
+              <a:t>A co gdybyśmy chcieli nie tylko posortować nasze monety, ale także dowiedzieć się, ile pieniędzy mamy? Tutaj z pomocą przyjdzie nam funkcja, która nie tylko posortuje zadany zbiór monet, ale także policzy ich sumę, zwracając ją jako wynik.</a:t>
+            </a:r>
+          </a:p>
+          <a:p>
             <a:endParaRPr lang="pl-PL" dirty="0"/>
+          </a:p>
+          <a:p>
+            <a:r>
+              <a:rPr lang="pl-PL" dirty="0"/>
+              <a:t>Jak widzimy, funkcje i procedury są do siebie bardzo zbliżone. W ogólności każdą procedurę możemy zamienić w funkcję, dodając jakiś wynik, który zwrócimy. Oczywiście nie zawsze ma </a:t>
+            </a:r>
+            <a:r>
+              <a:rPr lang="pl-PL"/>
+              <a:t>to sens.</a:t>
+            </a:r>
+            <a:endParaRPr lang="pl-PL" dirty="0"/>
+          </a:p>
+        </p:txBody>
+      </p:sp>
+      <p:sp>
+        <p:nvSpPr>
+          <p:cNvPr id="4" name="Symbol zastępczy numeru slajdu 3"/>
+          <p:cNvSpPr>
+            <a:spLocks noGrp="1"/>
+          </p:cNvSpPr>
+          <p:nvPr>
+            <p:ph type="sldNum" sz="quarter" idx="10"/>
+          </p:nvPr>
+        </p:nvSpPr>
+        <p:spPr/>
+        <p:txBody>
+          <a:bodyPr/>
+          <a:lstStyle/>
+          <a:p>
+            <a:fld id="{3B74BC4B-68D2-D045-B40C-9F6F38B122F3}" type="slidenum">
+              <a:rPr lang="pl-PL" smtClean="0"/>
+              <a:t>13</a:t>
+            </a:fld>
+            <a:endParaRPr lang="pl-PL"/>
+          </a:p>
+        </p:txBody>
+      </p:sp>
+    </p:spTree>
+    <p:extLst>
+      <p:ext uri="{BB962C8B-B14F-4D97-AF65-F5344CB8AC3E}">
+        <p14:creationId xmlns:p14="http://schemas.microsoft.com/office/powerpoint/2010/main" val="1941948515"/>
+      </p:ext>
+    </p:extLst>
+  </p:cSld>
+  <p:clrMapOvr>
+    <a:masterClrMapping/>
+  </p:clrMapOvr>
+</p:notes>
+</file>
+
+<file path=ppt/notesSlides/notesSlide2.xml><?xml version="1.0" encoding="utf-8"?>
+<p:notes xmlns:a="http://schemas.openxmlformats.org/drawingml/2006/main" xmlns:r="http://schemas.openxmlformats.org/officeDocument/2006/relationships" xmlns:p="http://schemas.openxmlformats.org/presentationml/2006/main">
+  <p:cSld>
+    <p:spTree>
+      <p:nvGrpSpPr>
+        <p:cNvPr id="1" name=""/>
+        <p:cNvGrpSpPr/>
+        <p:nvPr/>
+      </p:nvGrpSpPr>
+      <p:grpSpPr>
+        <a:xfrm>
+          <a:off x="0" y="0"/>
+          <a:ext cx="0" cy="0"/>
+          <a:chOff x="0" y="0"/>
+          <a:chExt cx="0" cy="0"/>
+        </a:xfrm>
+      </p:grpSpPr>
+      <p:sp>
+        <p:nvSpPr>
+          <p:cNvPr id="2" name="Symbol zastępczy obrazu slajdu 1"/>
+          <p:cNvSpPr>
+            <a:spLocks noGrp="1" noRot="1" noChangeAspect="1"/>
+          </p:cNvSpPr>
+          <p:nvPr>
+            <p:ph type="sldImg"/>
+          </p:nvPr>
+        </p:nvSpPr>
+        <p:spPr/>
+      </p:sp>
+      <p:sp>
+        <p:nvSpPr>
+          <p:cNvPr id="3" name="Symbol zastępczy notatek 2"/>
+          <p:cNvSpPr>
+            <a:spLocks noGrp="1"/>
+          </p:cNvSpPr>
+          <p:nvPr>
+            <p:ph type="body" idx="1"/>
+          </p:nvPr>
+        </p:nvSpPr>
+        <p:spPr/>
+        <p:txBody>
+          <a:bodyPr/>
+          <a:lstStyle/>
+          <a:p>
+            <a:r>
+              <a:rPr lang="pl-PL" dirty="0"/>
+              <a:t>Do funkcji przekazujemy określone przez jej specyfikację dane, a otrzymujemy w zamian wynik.</a:t>
+            </a:r>
+          </a:p>
+        </p:txBody>
+      </p:sp>
+      <p:sp>
+        <p:nvSpPr>
+          <p:cNvPr id="4" name="Symbol zastępczy numeru slajdu 3"/>
+          <p:cNvSpPr>
+            <a:spLocks noGrp="1"/>
+          </p:cNvSpPr>
+          <p:nvPr>
+            <p:ph type="sldNum" sz="quarter" idx="10"/>
+          </p:nvPr>
+        </p:nvSpPr>
+        <p:spPr/>
+        <p:txBody>
+          <a:bodyPr/>
+          <a:lstStyle/>
+          <a:p>
+            <a:fld id="{3B74BC4B-68D2-D045-B40C-9F6F38B122F3}" type="slidenum">
+              <a:rPr lang="pl-PL" smtClean="0"/>
+              <a:t>3</a:t>
+            </a:fld>
+            <a:endParaRPr lang="pl-PL"/>
+          </a:p>
+        </p:txBody>
+      </p:sp>
+    </p:spTree>
+    <p:extLst>
+      <p:ext uri="{BB962C8B-B14F-4D97-AF65-F5344CB8AC3E}">
+        <p14:creationId xmlns:p14="http://schemas.microsoft.com/office/powerpoint/2010/main" val="2933847771"/>
+      </p:ext>
+    </p:extLst>
+  </p:cSld>
+  <p:clrMapOvr>
+    <a:masterClrMapping/>
+  </p:clrMapOvr>
+</p:notes>
+</file>
+
+<file path=ppt/notesSlides/notesSlide3.xml><?xml version="1.0" encoding="utf-8"?>
+<p:notes xmlns:a="http://schemas.openxmlformats.org/drawingml/2006/main" xmlns:r="http://schemas.openxmlformats.org/officeDocument/2006/relationships" xmlns:p="http://schemas.openxmlformats.org/presentationml/2006/main">
+  <p:cSld>
+    <p:spTree>
+      <p:nvGrpSpPr>
+        <p:cNvPr id="1" name=""/>
+        <p:cNvGrpSpPr/>
+        <p:nvPr/>
+      </p:nvGrpSpPr>
+      <p:grpSpPr>
+        <a:xfrm>
+          <a:off x="0" y="0"/>
+          <a:ext cx="0" cy="0"/>
+          <a:chOff x="0" y="0"/>
+          <a:chExt cx="0" cy="0"/>
+        </a:xfrm>
+      </p:grpSpPr>
+      <p:sp>
+        <p:nvSpPr>
+          <p:cNvPr id="2" name="Symbol zastępczy obrazu slajdu 1"/>
+          <p:cNvSpPr>
+            <a:spLocks noGrp="1" noRot="1" noChangeAspect="1"/>
+          </p:cNvSpPr>
+          <p:nvPr>
+            <p:ph type="sldImg"/>
+          </p:nvPr>
+        </p:nvSpPr>
+        <p:spPr/>
+      </p:sp>
+      <p:sp>
+        <p:nvSpPr>
+          <p:cNvPr id="3" name="Symbol zastępczy notatek 2"/>
+          <p:cNvSpPr>
+            <a:spLocks noGrp="1"/>
+          </p:cNvSpPr>
+          <p:nvPr>
+            <p:ph type="body" idx="1"/>
+          </p:nvPr>
+        </p:nvSpPr>
+        <p:spPr/>
+        <p:txBody>
+          <a:bodyPr/>
+          <a:lstStyle/>
+          <a:p>
+            <a:r>
+              <a:rPr lang="pl-PL" dirty="0"/>
+              <a:t>Funkcja może przyjmować kilka, określonych parametrów. Może też nie przyjmować ich wcale. Następnie wewnątrz funkcji (w jej ciele) wykonywane są jakieś operacje. Efektem tych operacji musi być zwrócenie konkretnego wyniku.</a:t>
+            </a:r>
+          </a:p>
+        </p:txBody>
+      </p:sp>
+      <p:sp>
+        <p:nvSpPr>
+          <p:cNvPr id="4" name="Symbol zastępczy numeru slajdu 3"/>
+          <p:cNvSpPr>
+            <a:spLocks noGrp="1"/>
+          </p:cNvSpPr>
+          <p:nvPr>
+            <p:ph type="sldNum" sz="quarter" idx="10"/>
+          </p:nvPr>
+        </p:nvSpPr>
+        <p:spPr/>
+        <p:txBody>
+          <a:bodyPr/>
+          <a:lstStyle/>
+          <a:p>
+            <a:fld id="{3B74BC4B-68D2-D045-B40C-9F6F38B122F3}" type="slidenum">
+              <a:rPr lang="pl-PL" smtClean="0"/>
+              <a:t>5</a:t>
+            </a:fld>
+            <a:endParaRPr lang="pl-PL"/>
+          </a:p>
+        </p:txBody>
+      </p:sp>
+    </p:spTree>
+    <p:extLst>
+      <p:ext uri="{BB962C8B-B14F-4D97-AF65-F5344CB8AC3E}">
+        <p14:creationId xmlns:p14="http://schemas.microsoft.com/office/powerpoint/2010/main" val="671586335"/>
+      </p:ext>
+    </p:extLst>
+  </p:cSld>
+  <p:clrMapOvr>
+    <a:masterClrMapping/>
+  </p:clrMapOvr>
+</p:notes>
+</file>
+
+<file path=ppt/notesSlides/notesSlide4.xml><?xml version="1.0" encoding="utf-8"?>
+<p:notes xmlns:a="http://schemas.openxmlformats.org/drawingml/2006/main" xmlns:r="http://schemas.openxmlformats.org/officeDocument/2006/relationships" xmlns:p="http://schemas.openxmlformats.org/presentationml/2006/main">
+  <p:cSld>
+    <p:spTree>
+      <p:nvGrpSpPr>
+        <p:cNvPr id="1" name=""/>
+        <p:cNvGrpSpPr/>
+        <p:nvPr/>
+      </p:nvGrpSpPr>
+      <p:grpSpPr>
+        <a:xfrm>
+          <a:off x="0" y="0"/>
+          <a:ext cx="0" cy="0"/>
+          <a:chOff x="0" y="0"/>
+          <a:chExt cx="0" cy="0"/>
+        </a:xfrm>
+      </p:grpSpPr>
+      <p:sp>
+        <p:nvSpPr>
+          <p:cNvPr id="2" name="Symbol zastępczy obrazu slajdu 1"/>
+          <p:cNvSpPr>
+            <a:spLocks noGrp="1" noRot="1" noChangeAspect="1"/>
+          </p:cNvSpPr>
+          <p:nvPr>
+            <p:ph type="sldImg"/>
+          </p:nvPr>
+        </p:nvSpPr>
+        <p:spPr/>
+      </p:sp>
+      <p:sp>
+        <p:nvSpPr>
+          <p:cNvPr id="3" name="Symbol zastępczy notatek 2"/>
+          <p:cNvSpPr>
+            <a:spLocks noGrp="1"/>
+          </p:cNvSpPr>
+          <p:nvPr>
+            <p:ph type="body" idx="1"/>
+          </p:nvPr>
+        </p:nvSpPr>
+        <p:spPr/>
+        <p:txBody>
+          <a:bodyPr/>
+          <a:lstStyle/>
+          <a:p>
+            <a:r>
+              <a:rPr lang="pl-PL" dirty="0"/>
+              <a:t>Świetnym przykładem funkcji może być maszyna do kawy, która służy nam tutaj za czarne pudełko. Wrzucamy do niej odpowiednią kwotę, wybieramy kawę, a jeżeli dane wejściowe były poprawne, to maszyna przemieli, popracuje i zwróci nam kawę.</a:t>
+            </a:r>
+          </a:p>
+          <a:p>
+            <a:r>
+              <a:rPr lang="pl-PL" dirty="0"/>
+              <a:t>Zwróćmy uwagę na to, że nie musimy wiedzieć, jak dokładnie działa maszyna do kawy, żeby z niej skorzystać! Musimy tylko wiedzieć, jak ją obsłużyć. Co się dzieje z naszymi pieniędzmi i skąd się bierze kawa nie jest już takie istotne.</a:t>
+            </a:r>
+          </a:p>
+          <a:p>
+            <a:r>
+              <a:rPr lang="pl-PL" dirty="0"/>
+              <a:t>Podobnie jest z funkcjami. Nie musimy wiedzieć, jak są zaimplementowane, by móc z nich skorzystać.</a:t>
+            </a:r>
+          </a:p>
+        </p:txBody>
+      </p:sp>
+      <p:sp>
+        <p:nvSpPr>
+          <p:cNvPr id="4" name="Symbol zastępczy numeru slajdu 3"/>
+          <p:cNvSpPr>
+            <a:spLocks noGrp="1"/>
+          </p:cNvSpPr>
+          <p:nvPr>
+            <p:ph type="sldNum" sz="quarter" idx="10"/>
+          </p:nvPr>
+        </p:nvSpPr>
+        <p:spPr/>
+        <p:txBody>
+          <a:bodyPr/>
+          <a:lstStyle/>
+          <a:p>
+            <a:fld id="{3B74BC4B-68D2-D045-B40C-9F6F38B122F3}" type="slidenum">
+              <a:rPr lang="pl-PL" smtClean="0"/>
+              <a:t>7</a:t>
+            </a:fld>
+            <a:endParaRPr lang="pl-PL"/>
+          </a:p>
+        </p:txBody>
+      </p:sp>
+    </p:spTree>
+    <p:extLst>
+      <p:ext uri="{BB962C8B-B14F-4D97-AF65-F5344CB8AC3E}">
+        <p14:creationId xmlns:p14="http://schemas.microsoft.com/office/powerpoint/2010/main" val="2780549995"/>
+      </p:ext>
+    </p:extLst>
+  </p:cSld>
+  <p:clrMapOvr>
+    <a:masterClrMapping/>
+  </p:clrMapOvr>
+</p:notes>
+</file>
+
+<file path=ppt/notesSlides/notesSlide5.xml><?xml version="1.0" encoding="utf-8"?>
+<p:notes xmlns:a="http://schemas.openxmlformats.org/drawingml/2006/main" xmlns:r="http://schemas.openxmlformats.org/officeDocument/2006/relationships" xmlns:p="http://schemas.openxmlformats.org/presentationml/2006/main">
+  <p:cSld>
+    <p:spTree>
+      <p:nvGrpSpPr>
+        <p:cNvPr id="1" name=""/>
+        <p:cNvGrpSpPr/>
+        <p:nvPr/>
+      </p:nvGrpSpPr>
+      <p:grpSpPr>
+        <a:xfrm>
+          <a:off x="0" y="0"/>
+          <a:ext cx="0" cy="0"/>
+          <a:chOff x="0" y="0"/>
+          <a:chExt cx="0" cy="0"/>
+        </a:xfrm>
+      </p:grpSpPr>
+      <p:sp>
+        <p:nvSpPr>
+          <p:cNvPr id="2" name="Symbol zastępczy obrazu slajdu 1"/>
+          <p:cNvSpPr>
+            <a:spLocks noGrp="1" noRot="1" noChangeAspect="1"/>
+          </p:cNvSpPr>
+          <p:nvPr>
+            <p:ph type="sldImg"/>
+          </p:nvPr>
+        </p:nvSpPr>
+        <p:spPr/>
+      </p:sp>
+      <p:sp>
+        <p:nvSpPr>
+          <p:cNvPr id="3" name="Symbol zastępczy notatek 2"/>
+          <p:cNvSpPr>
+            <a:spLocks noGrp="1"/>
+          </p:cNvSpPr>
+          <p:nvPr>
+            <p:ph type="body" idx="1"/>
+          </p:nvPr>
+        </p:nvSpPr>
+        <p:spPr/>
+        <p:txBody>
+          <a:bodyPr/>
+          <a:lstStyle/>
+          <a:p>
+            <a:r>
+              <a:rPr lang="pl-PL" dirty="0"/>
+              <a:t>Bardzo prosty algorytm funkcji maszyny do kawy możemy zapisać w przedstawiony sposób. Oczywiście w praktycznym przypadku powinniśmy obsłużyć wszystkie dostępne rodzaje kawy, a także takie sytuacje jak brak kubków, mleka, czy też niepoprawną kwotę, albo zwrócenie reszty.</a:t>
+            </a:r>
+          </a:p>
+        </p:txBody>
+      </p:sp>
+      <p:sp>
+        <p:nvSpPr>
+          <p:cNvPr id="4" name="Symbol zastępczy numeru slajdu 3"/>
+          <p:cNvSpPr>
+            <a:spLocks noGrp="1"/>
+          </p:cNvSpPr>
+          <p:nvPr>
+            <p:ph type="sldNum" sz="quarter" idx="10"/>
+          </p:nvPr>
+        </p:nvSpPr>
+        <p:spPr/>
+        <p:txBody>
+          <a:bodyPr/>
+          <a:lstStyle/>
+          <a:p>
+            <a:fld id="{3B74BC4B-68D2-D045-B40C-9F6F38B122F3}" type="slidenum">
+              <a:rPr lang="pl-PL" smtClean="0"/>
+              <a:t>8</a:t>
+            </a:fld>
+            <a:endParaRPr lang="pl-PL"/>
+          </a:p>
+        </p:txBody>
+      </p:sp>
+    </p:spTree>
+    <p:extLst>
+      <p:ext uri="{BB962C8B-B14F-4D97-AF65-F5344CB8AC3E}">
+        <p14:creationId xmlns:p14="http://schemas.microsoft.com/office/powerpoint/2010/main" val="810094370"/>
+      </p:ext>
+    </p:extLst>
+  </p:cSld>
+  <p:clrMapOvr>
+    <a:masterClrMapping/>
+  </p:clrMapOvr>
+</p:notes>
+</file>
+
+<file path=ppt/notesSlides/notesSlide6.xml><?xml version="1.0" encoding="utf-8"?>
+<p:notes xmlns:a="http://schemas.openxmlformats.org/drawingml/2006/main" xmlns:r="http://schemas.openxmlformats.org/officeDocument/2006/relationships" xmlns:p="http://schemas.openxmlformats.org/presentationml/2006/main">
+  <p:cSld>
+    <p:spTree>
+      <p:nvGrpSpPr>
+        <p:cNvPr id="1" name=""/>
+        <p:cNvGrpSpPr/>
+        <p:nvPr/>
+      </p:nvGrpSpPr>
+      <p:grpSpPr>
+        <a:xfrm>
+          <a:off x="0" y="0"/>
+          <a:ext cx="0" cy="0"/>
+          <a:chOff x="0" y="0"/>
+          <a:chExt cx="0" cy="0"/>
+        </a:xfrm>
+      </p:grpSpPr>
+      <p:sp>
+        <p:nvSpPr>
+          <p:cNvPr id="2" name="Symbol zastępczy obrazu slajdu 1"/>
+          <p:cNvSpPr>
+            <a:spLocks noGrp="1" noRot="1" noChangeAspect="1"/>
+          </p:cNvSpPr>
+          <p:nvPr>
+            <p:ph type="sldImg"/>
+          </p:nvPr>
+        </p:nvSpPr>
+        <p:spPr/>
+      </p:sp>
+      <p:sp>
+        <p:nvSpPr>
+          <p:cNvPr id="3" name="Symbol zastępczy notatek 2"/>
+          <p:cNvSpPr>
+            <a:spLocks noGrp="1"/>
+          </p:cNvSpPr>
+          <p:nvPr>
+            <p:ph type="body" idx="1"/>
+          </p:nvPr>
+        </p:nvSpPr>
+        <p:spPr/>
+        <p:txBody>
+          <a:bodyPr/>
+          <a:lstStyle/>
+          <a:p>
+            <a:r>
+              <a:rPr lang="pl-PL" dirty="0"/>
+              <a:t>Poza funkcjami mamy także zbliżone do nich konstrukcje zwane procedurami. Jak widać, procedura to czarne pudełko które tylko przyjmuje dane, ale nic nie zwraca. Jakie jest więc zadanie procedury? Zobaczmy na przykładzie.</a:t>
+            </a:r>
+          </a:p>
+        </p:txBody>
+      </p:sp>
+      <p:sp>
+        <p:nvSpPr>
+          <p:cNvPr id="4" name="Symbol zastępczy numeru slajdu 3"/>
+          <p:cNvSpPr>
+            <a:spLocks noGrp="1"/>
+          </p:cNvSpPr>
+          <p:nvPr>
+            <p:ph type="sldNum" sz="quarter" idx="10"/>
+          </p:nvPr>
+        </p:nvSpPr>
+        <p:spPr/>
+        <p:txBody>
+          <a:bodyPr/>
+          <a:lstStyle/>
+          <a:p>
+            <a:fld id="{3B74BC4B-68D2-D045-B40C-9F6F38B122F3}" type="slidenum">
+              <a:rPr lang="pl-PL" smtClean="0"/>
+              <a:t>9</a:t>
+            </a:fld>
+            <a:endParaRPr lang="pl-PL"/>
+          </a:p>
+        </p:txBody>
+      </p:sp>
+    </p:spTree>
+    <p:extLst>
+      <p:ext uri="{BB962C8B-B14F-4D97-AF65-F5344CB8AC3E}">
+        <p14:creationId xmlns:p14="http://schemas.microsoft.com/office/powerpoint/2010/main" val="2790704848"/>
+      </p:ext>
+    </p:extLst>
+  </p:cSld>
+  <p:clrMapOvr>
+    <a:masterClrMapping/>
+  </p:clrMapOvr>
+</p:notes>
+</file>
+
+<file path=ppt/notesSlides/notesSlide7.xml><?xml version="1.0" encoding="utf-8"?>
+<p:notes xmlns:a="http://schemas.openxmlformats.org/drawingml/2006/main" xmlns:r="http://schemas.openxmlformats.org/officeDocument/2006/relationships" xmlns:p="http://schemas.openxmlformats.org/presentationml/2006/main">
+  <p:cSld>
+    <p:spTree>
+      <p:nvGrpSpPr>
+        <p:cNvPr id="1" name=""/>
+        <p:cNvGrpSpPr/>
+        <p:nvPr/>
+      </p:nvGrpSpPr>
+      <p:grpSpPr>
+        <a:xfrm>
+          <a:off x="0" y="0"/>
+          <a:ext cx="0" cy="0"/>
+          <a:chOff x="0" y="0"/>
+          <a:chExt cx="0" cy="0"/>
+        </a:xfrm>
+      </p:grpSpPr>
+      <p:sp>
+        <p:nvSpPr>
+          <p:cNvPr id="2" name="Symbol zastępczy obrazu slajdu 1"/>
+          <p:cNvSpPr>
+            <a:spLocks noGrp="1" noRot="1" noChangeAspect="1"/>
+          </p:cNvSpPr>
+          <p:nvPr>
+            <p:ph type="sldImg"/>
+          </p:nvPr>
+        </p:nvSpPr>
+        <p:spPr/>
+      </p:sp>
+      <p:sp>
+        <p:nvSpPr>
+          <p:cNvPr id="3" name="Symbol zastępczy notatek 2"/>
+          <p:cNvSpPr>
+            <a:spLocks noGrp="1"/>
+          </p:cNvSpPr>
+          <p:nvPr>
+            <p:ph type="body" idx="1"/>
+          </p:nvPr>
+        </p:nvSpPr>
+        <p:spPr/>
+        <p:txBody>
+          <a:bodyPr/>
+          <a:lstStyle/>
+          <a:p>
+            <a:r>
+              <a:rPr lang="pl-PL" dirty="0"/>
+              <a:t>Procedura co prawda nie zwraca konkretnego wyniku, ale może modyfikować środowisko, w którym pracuje. Np. procedura zmieniająca formację samolotów nie zwraca nam konkretnego wyniku, ale jednak coś robi. Po jej wywołaniu układ samolotów zostanie zmieniony. Procedury zazwyczaj operują na zmiennych globalnych.</a:t>
+            </a:r>
           </a:p>
         </p:txBody>
       </p:sp>
@@ -563,6 +1201,180 @@
     <p:extLst>
       <p:ext uri="{BB962C8B-B14F-4D97-AF65-F5344CB8AC3E}">
         <p14:creationId xmlns:p14="http://schemas.microsoft.com/office/powerpoint/2010/main" val="334045961"/>
+      </p:ext>
+    </p:extLst>
+  </p:cSld>
+  <p:clrMapOvr>
+    <a:masterClrMapping/>
+  </p:clrMapOvr>
+</p:notes>
+</file>
+
+<file path=ppt/notesSlides/notesSlide8.xml><?xml version="1.0" encoding="utf-8"?>
+<p:notes xmlns:a="http://schemas.openxmlformats.org/drawingml/2006/main" xmlns:r="http://schemas.openxmlformats.org/officeDocument/2006/relationships" xmlns:p="http://schemas.openxmlformats.org/presentationml/2006/main">
+  <p:cSld>
+    <p:spTree>
+      <p:nvGrpSpPr>
+        <p:cNvPr id="1" name=""/>
+        <p:cNvGrpSpPr/>
+        <p:nvPr/>
+      </p:nvGrpSpPr>
+      <p:grpSpPr>
+        <a:xfrm>
+          <a:off x="0" y="0"/>
+          <a:ext cx="0" cy="0"/>
+          <a:chOff x="0" y="0"/>
+          <a:chExt cx="0" cy="0"/>
+        </a:xfrm>
+      </p:grpSpPr>
+      <p:sp>
+        <p:nvSpPr>
+          <p:cNvPr id="2" name="Symbol zastępczy obrazu slajdu 1"/>
+          <p:cNvSpPr>
+            <a:spLocks noGrp="1" noRot="1" noChangeAspect="1"/>
+          </p:cNvSpPr>
+          <p:nvPr>
+            <p:ph type="sldImg"/>
+          </p:nvPr>
+        </p:nvSpPr>
+        <p:spPr/>
+      </p:sp>
+      <p:sp>
+        <p:nvSpPr>
+          <p:cNvPr id="3" name="Symbol zastępczy notatek 2"/>
+          <p:cNvSpPr>
+            <a:spLocks noGrp="1"/>
+          </p:cNvSpPr>
+          <p:nvPr>
+            <p:ph type="body" idx="1"/>
+          </p:nvPr>
+        </p:nvSpPr>
+        <p:spPr/>
+        <p:txBody>
+          <a:bodyPr/>
+          <a:lstStyle/>
+          <a:p>
+            <a:r>
+              <a:rPr lang="pl-PL" dirty="0"/>
+              <a:t>I jeszcze raz. Funkcja przyjmuje dane i zwraca konkretny wynik. Procedura przyjmuje dane, ale nie zwraca wyniku. Zarówno funkcja jak i procedura mogą modyfikować środowisko w którym się znajdują, np. zmienne globalne.</a:t>
+            </a:r>
+          </a:p>
+        </p:txBody>
+      </p:sp>
+      <p:sp>
+        <p:nvSpPr>
+          <p:cNvPr id="4" name="Symbol zastępczy numeru slajdu 3"/>
+          <p:cNvSpPr>
+            <a:spLocks noGrp="1"/>
+          </p:cNvSpPr>
+          <p:nvPr>
+            <p:ph type="sldNum" sz="quarter" idx="10"/>
+          </p:nvPr>
+        </p:nvSpPr>
+        <p:spPr/>
+        <p:txBody>
+          <a:bodyPr/>
+          <a:lstStyle/>
+          <a:p>
+            <a:fld id="{3B74BC4B-68D2-D045-B40C-9F6F38B122F3}" type="slidenum">
+              <a:rPr lang="pl-PL" smtClean="0"/>
+              <a:t>11</a:t>
+            </a:fld>
+            <a:endParaRPr lang="pl-PL"/>
+          </a:p>
+        </p:txBody>
+      </p:sp>
+    </p:spTree>
+    <p:extLst>
+      <p:ext uri="{BB962C8B-B14F-4D97-AF65-F5344CB8AC3E}">
+        <p14:creationId xmlns:p14="http://schemas.microsoft.com/office/powerpoint/2010/main" val="3749182833"/>
+      </p:ext>
+    </p:extLst>
+  </p:cSld>
+  <p:clrMapOvr>
+    <a:masterClrMapping/>
+  </p:clrMapOvr>
+</p:notes>
+</file>
+
+<file path=ppt/notesSlides/notesSlide9.xml><?xml version="1.0" encoding="utf-8"?>
+<p:notes xmlns:a="http://schemas.openxmlformats.org/drawingml/2006/main" xmlns:r="http://schemas.openxmlformats.org/officeDocument/2006/relationships" xmlns:p="http://schemas.openxmlformats.org/presentationml/2006/main">
+  <p:cSld>
+    <p:spTree>
+      <p:nvGrpSpPr>
+        <p:cNvPr id="1" name=""/>
+        <p:cNvGrpSpPr/>
+        <p:nvPr/>
+      </p:nvGrpSpPr>
+      <p:grpSpPr>
+        <a:xfrm>
+          <a:off x="0" y="0"/>
+          <a:ext cx="0" cy="0"/>
+          <a:chOff x="0" y="0"/>
+          <a:chExt cx="0" cy="0"/>
+        </a:xfrm>
+      </p:grpSpPr>
+      <p:sp>
+        <p:nvSpPr>
+          <p:cNvPr id="2" name="Symbol zastępczy obrazu slajdu 1"/>
+          <p:cNvSpPr>
+            <a:spLocks noGrp="1" noRot="1" noChangeAspect="1"/>
+          </p:cNvSpPr>
+          <p:nvPr>
+            <p:ph type="sldImg"/>
+          </p:nvPr>
+        </p:nvSpPr>
+        <p:spPr/>
+      </p:sp>
+      <p:sp>
+        <p:nvSpPr>
+          <p:cNvPr id="3" name="Symbol zastępczy notatek 2"/>
+          <p:cNvSpPr>
+            <a:spLocks noGrp="1"/>
+          </p:cNvSpPr>
+          <p:nvPr>
+            <p:ph type="body" idx="1"/>
+          </p:nvPr>
+        </p:nvSpPr>
+        <p:spPr/>
+        <p:txBody>
+          <a:bodyPr/>
+          <a:lstStyle/>
+          <a:p>
+            <a:r>
+              <a:rPr lang="pl-PL" dirty="0"/>
+              <a:t>Kolejny przykład. Wyobraźmy sobie następujący problem: mamy zbiór monet i chcemy je posortować układając w osobne grupy. W tym celu możemy stworzyć procedurę, która posortuje zadany zbiór monet.</a:t>
+            </a:r>
+          </a:p>
+        </p:txBody>
+      </p:sp>
+      <p:sp>
+        <p:nvSpPr>
+          <p:cNvPr id="4" name="Symbol zastępczy numeru slajdu 3"/>
+          <p:cNvSpPr>
+            <a:spLocks noGrp="1"/>
+          </p:cNvSpPr>
+          <p:nvPr>
+            <p:ph type="sldNum" sz="quarter" idx="10"/>
+          </p:nvPr>
+        </p:nvSpPr>
+        <p:spPr/>
+        <p:txBody>
+          <a:bodyPr/>
+          <a:lstStyle/>
+          <a:p>
+            <a:fld id="{3B74BC4B-68D2-D045-B40C-9F6F38B122F3}" type="slidenum">
+              <a:rPr lang="pl-PL" smtClean="0"/>
+              <a:t>12</a:t>
+            </a:fld>
+            <a:endParaRPr lang="pl-PL"/>
+          </a:p>
+        </p:txBody>
+      </p:sp>
+    </p:spTree>
+    <p:extLst>
+      <p:ext uri="{BB962C8B-B14F-4D97-AF65-F5344CB8AC3E}">
+        <p14:creationId xmlns:p14="http://schemas.microsoft.com/office/powerpoint/2010/main" val="1267668159"/>
       </p:ext>
     </p:extLst>
   </p:cSld>
@@ -720,7 +1532,7 @@
             <a:fld id="{48C97C24-B5A0-4EEB-AF04-DC997EDCD259}" type="datetimeFigureOut">
               <a:rPr lang="pl-PL" smtClean="0"/>
               <a:pPr/>
-              <a:t>14.06.2018</a:t>
+              <a:t>21.06.2018</a:t>
             </a:fld>
             <a:endParaRPr lang="pl-PL"/>
           </a:p>
@@ -920,7 +1732,7 @@
             <a:fld id="{48C97C24-B5A0-4EEB-AF04-DC997EDCD259}" type="datetimeFigureOut">
               <a:rPr lang="pl-PL" smtClean="0"/>
               <a:pPr/>
-              <a:t>14.06.2018</a:t>
+              <a:t>21.06.2018</a:t>
             </a:fld>
             <a:endParaRPr lang="pl-PL"/>
           </a:p>
@@ -1130,7 +1942,7 @@
             <a:fld id="{48C97C24-B5A0-4EEB-AF04-DC997EDCD259}" type="datetimeFigureOut">
               <a:rPr lang="pl-PL" smtClean="0"/>
               <a:pPr/>
-              <a:t>14.06.2018</a:t>
+              <a:t>21.06.2018</a:t>
             </a:fld>
             <a:endParaRPr lang="pl-PL"/>
           </a:p>
@@ -1330,7 +2142,7 @@
             <a:fld id="{48C97C24-B5A0-4EEB-AF04-DC997EDCD259}" type="datetimeFigureOut">
               <a:rPr lang="pl-PL" smtClean="0"/>
               <a:pPr/>
-              <a:t>14.06.2018</a:t>
+              <a:t>21.06.2018</a:t>
             </a:fld>
             <a:endParaRPr lang="pl-PL"/>
           </a:p>
@@ -1607,7 +2419,7 @@
             <a:fld id="{48C97C24-B5A0-4EEB-AF04-DC997EDCD259}" type="datetimeFigureOut">
               <a:rPr lang="pl-PL" smtClean="0"/>
               <a:pPr/>
-              <a:t>14.06.2018</a:t>
+              <a:t>21.06.2018</a:t>
             </a:fld>
             <a:endParaRPr lang="pl-PL"/>
           </a:p>
@@ -1874,7 +2686,7 @@
             <a:fld id="{48C97C24-B5A0-4EEB-AF04-DC997EDCD259}" type="datetimeFigureOut">
               <a:rPr lang="pl-PL" smtClean="0"/>
               <a:pPr/>
-              <a:t>14.06.2018</a:t>
+              <a:t>21.06.2018</a:t>
             </a:fld>
             <a:endParaRPr lang="pl-PL"/>
           </a:p>
@@ -2288,7 +3100,7 @@
             <a:fld id="{48C97C24-B5A0-4EEB-AF04-DC997EDCD259}" type="datetimeFigureOut">
               <a:rPr lang="pl-PL" smtClean="0"/>
               <a:pPr/>
-              <a:t>14.06.2018</a:t>
+              <a:t>21.06.2018</a:t>
             </a:fld>
             <a:endParaRPr lang="pl-PL"/>
           </a:p>
@@ -2431,7 +3243,7 @@
             <a:fld id="{48C97C24-B5A0-4EEB-AF04-DC997EDCD259}" type="datetimeFigureOut">
               <a:rPr lang="pl-PL" smtClean="0"/>
               <a:pPr/>
-              <a:t>14.06.2018</a:t>
+              <a:t>21.06.2018</a:t>
             </a:fld>
             <a:endParaRPr lang="pl-PL"/>
           </a:p>
@@ -2546,7 +3358,7 @@
             <a:fld id="{48C97C24-B5A0-4EEB-AF04-DC997EDCD259}" type="datetimeFigureOut">
               <a:rPr lang="pl-PL" smtClean="0"/>
               <a:pPr/>
-              <a:t>14.06.2018</a:t>
+              <a:t>21.06.2018</a:t>
             </a:fld>
             <a:endParaRPr lang="pl-PL"/>
           </a:p>
@@ -2859,7 +3671,7 @@
             <a:fld id="{48C97C24-B5A0-4EEB-AF04-DC997EDCD259}" type="datetimeFigureOut">
               <a:rPr lang="pl-PL" smtClean="0"/>
               <a:pPr/>
-              <a:t>14.06.2018</a:t>
+              <a:t>21.06.2018</a:t>
             </a:fld>
             <a:endParaRPr lang="pl-PL"/>
           </a:p>
@@ -3149,7 +3961,7 @@
             <a:fld id="{48C97C24-B5A0-4EEB-AF04-DC997EDCD259}" type="datetimeFigureOut">
               <a:rPr lang="pl-PL" smtClean="0"/>
               <a:pPr/>
-              <a:t>14.06.2018</a:t>
+              <a:t>21.06.2018</a:t>
             </a:fld>
             <a:endParaRPr lang="pl-PL"/>
           </a:p>
@@ -3392,7 +4204,7 @@
             <a:fld id="{48C97C24-B5A0-4EEB-AF04-DC997EDCD259}" type="datetimeFigureOut">
               <a:rPr lang="pl-PL" smtClean="0"/>
               <a:pPr/>
-              <a:t>14.06.2018</a:t>
+              <a:t>21.06.2018</a:t>
             </a:fld>
             <a:endParaRPr lang="pl-PL"/>
           </a:p>
@@ -4137,7 +4949,7 @@
           <p:nvPr/>
         </p:nvPicPr>
         <p:blipFill>
-          <a:blip r:embed="rId2" cstate="print"/>
+          <a:blip r:embed="rId3" cstate="print"/>
           <a:srcRect/>
           <a:stretch>
             <a:fillRect/>
@@ -4301,7 +5113,7 @@
           <p:nvPr/>
         </p:nvPicPr>
         <p:blipFill>
-          <a:blip r:embed="rId2" cstate="print"/>
+          <a:blip r:embed="rId3" cstate="print"/>
           <a:srcRect/>
           <a:stretch>
             <a:fillRect/>
@@ -4557,8 +5369,8 @@
           </a:p>
         </p:txBody>
       </p:sp>
-      <mc:AlternateContent xmlns:mc="http://schemas.openxmlformats.org/markup-compatibility/2006" xmlns:am3d="http://schemas.microsoft.com/office/drawing/2017/model3d">
-        <mc:Choice Requires="am3d">
+      <mc:AlternateContent xmlns:mc="http://schemas.openxmlformats.org/markup-compatibility/2006">
+        <mc:Choice xmlns="" xmlns:am3d="http://schemas.microsoft.com/office/drawing/2017/model3d" Requires="am3d">
           <p:graphicFrame>
             <p:nvGraphicFramePr>
               <p:cNvPr id="19" name="Symbol zastępczy zawartości 3" descr="Dark Gray Cube">
@@ -4586,7 +5398,7 @@
             </p:xfrm>
             <a:graphic>
               <a:graphicData uri="http://schemas.microsoft.com/office/drawing/2017/model3d">
-                <am3d:model3d r:embed="rId3">
+                <am3d:model3d r:embed="rId4">
                   <am3d:spPr>
                     <a:xfrm>
                       <a:off x="0" y="0"/>
@@ -4613,9 +5425,9 @@
                     <am3d:rot ax="2457929" ay="2235546" az="1663670"/>
                     <am3d:postTrans dx="0" dy="0" dz="0"/>
                   </am3d:trans>
-                  <am3d:attrSrcUrl r:id="rId4"/>
+                  <am3d:attrSrcUrl r:id="rId5"/>
                   <am3d:raster rName="Office3DRenderer" rVer="16.0.8326">
-                    <am3d:blip r:embed="rId5"/>
+                    <am3d:blip r:embed="rId6"/>
                   </am3d:raster>
                   <am3d:objViewport viewportSz="1311488"/>
                   <am3d:ambientLight>
@@ -4650,7 +5462,7 @@
             </a:graphic>
           </p:graphicFrame>
         </mc:Choice>
-        <mc:Fallback xmlns="">
+        <mc:Fallback>
           <p:pic>
             <p:nvPicPr>
               <p:cNvPr id="19" name="Symbol zastępczy zawartości 3" descr="Dark Gray Cube">
@@ -4666,7 +5478,7 @@
               <p:nvPr/>
             </p:nvPicPr>
             <p:blipFill>
-              <a:blip r:embed="rId6"/>
+              <a:blip r:embed="rId7"/>
               <a:stretch>
                 <a:fillRect/>
               </a:stretch>
@@ -4683,8 +5495,8 @@
           </p:pic>
         </mc:Fallback>
       </mc:AlternateContent>
-      <mc:AlternateContent xmlns:mc="http://schemas.openxmlformats.org/markup-compatibility/2006" xmlns:am3d="http://schemas.microsoft.com/office/drawing/2017/model3d">
-        <mc:Choice Requires="am3d">
+      <mc:AlternateContent xmlns:mc="http://schemas.openxmlformats.org/markup-compatibility/2006">
+        <mc:Choice xmlns="" xmlns:am3d="http://schemas.microsoft.com/office/drawing/2017/model3d" Requires="am3d">
           <p:graphicFrame>
             <p:nvGraphicFramePr>
               <p:cNvPr id="20" name="Symbol zastępczy zawartości 3" descr="Dark Gray Cube">
@@ -4711,7 +5523,7 @@
             </p:xfrm>
             <a:graphic>
               <a:graphicData uri="http://schemas.microsoft.com/office/drawing/2017/model3d">
-                <am3d:model3d r:embed="rId3">
+                <am3d:model3d r:embed="rId4">
                   <am3d:spPr>
                     <a:xfrm>
                       <a:off x="0" y="0"/>
@@ -4738,9 +5550,9 @@
                     <am3d:rot ax="2457929" ay="2235546" az="1663670"/>
                     <am3d:postTrans dx="0" dy="0" dz="0"/>
                   </am3d:trans>
-                  <am3d:attrSrcUrl r:id="rId4"/>
+                  <am3d:attrSrcUrl r:id="rId5"/>
                   <am3d:raster rName="Office3DRenderer" rVer="16.0.8326">
-                    <am3d:blip r:embed="rId5"/>
+                    <am3d:blip r:embed="rId6"/>
                   </am3d:raster>
                   <am3d:objViewport viewportSz="1311488"/>
                   <am3d:ambientLight>
@@ -4775,7 +5587,7 @@
             </a:graphic>
           </p:graphicFrame>
         </mc:Choice>
-        <mc:Fallback xmlns="">
+        <mc:Fallback>
           <p:pic>
             <p:nvPicPr>
               <p:cNvPr id="20" name="Symbol zastępczy zawartości 3" descr="Dark Gray Cube">
@@ -4791,7 +5603,7 @@
               <p:nvPr/>
             </p:nvPicPr>
             <p:blipFill>
-              <a:blip r:embed="rId6"/>
+              <a:blip r:embed="rId7"/>
               <a:stretch>
                 <a:fillRect/>
               </a:stretch>
@@ -4863,22 +5675,20 @@
       </p:sp>
       <p:pic>
         <p:nvPicPr>
-          <p:cNvPr id="5" name="Symbol zastępczy zawartości 4">
-            <a:extLst>
-              <a:ext uri="{FF2B5EF4-FFF2-40B4-BE49-F238E27FC236}">
-                <a16:creationId xmlns:a16="http://schemas.microsoft.com/office/drawing/2014/main" id="{5767BB80-D6CC-544C-9B86-8D8A8F180111}"/>
+          <p:cNvPr id="9" name="Symbol zastępczy zawartości 4">
+            <a:extLst>
+              <a:ext uri="{FF2B5EF4-FFF2-40B4-BE49-F238E27FC236}">
+                <a16:creationId xmlns:a16="http://schemas.microsoft.com/office/drawing/2014/main" id="{0E97D681-E166-DF4B-8E6A-23893C0D8495}"/>
               </a:ext>
             </a:extLst>
           </p:cNvPr>
           <p:cNvPicPr>
-            <a:picLocks noGrp="1" noChangeAspect="1"/>
+            <a:picLocks noChangeAspect="1"/>
           </p:cNvPicPr>
-          <p:nvPr>
-            <p:ph idx="1"/>
-          </p:nvPr>
+          <p:nvPr/>
         </p:nvPicPr>
         <p:blipFill>
-          <a:blip r:embed="rId2">
+          <a:blip r:embed="rId3">
             <a:extLst>
               <a:ext uri="{28A0092B-C50C-407E-A947-70E740481C1C}">
                 <a14:useLocalDpi xmlns:a14="http://schemas.microsoft.com/office/drawing/2010/main" val="0"/>
@@ -4891,17 +5701,47 @@
         </p:blipFill>
         <p:spPr>
           <a:xfrm>
-            <a:off x="6855108" y="2349411"/>
+            <a:off x="6855108" y="2482424"/>
             <a:ext cx="4498692" cy="2530514"/>
           </a:xfrm>
+          <a:prstGeom prst="roundRect">
+            <a:avLst>
+              <a:gd name="adj" fmla="val 11111"/>
+            </a:avLst>
+          </a:prstGeom>
+          <a:ln w="190500" cap="rnd">
+            <a:solidFill>
+              <a:srgbClr val="C8C6BD"/>
+            </a:solidFill>
+            <a:prstDash val="solid"/>
+          </a:ln>
+          <a:effectLst>
+            <a:outerShdw blurRad="101600" dist="50800" dir="7200000" algn="tl" rotWithShape="0">
+              <a:srgbClr val="000000">
+                <a:alpha val="45000"/>
+              </a:srgbClr>
+            </a:outerShdw>
+          </a:effectLst>
+          <a:scene3d>
+            <a:camera prst="perspectiveFront" fov="5400000"/>
+            <a:lightRig rig="threePt" dir="t">
+              <a:rot lat="0" lon="0" rev="19200000"/>
+            </a:lightRig>
+          </a:scene3d>
+          <a:sp3d extrusionH="25400">
+            <a:bevelT w="304800" h="152400" prst="hardEdge"/>
+            <a:extrusionClr>
+              <a:srgbClr val="FFFFFF"/>
+            </a:extrusionClr>
+          </a:sp3d>
         </p:spPr>
       </p:pic>
       <p:sp>
         <p:nvSpPr>
-          <p:cNvPr id="8" name="Strzałka: w prawo 11">
-            <a:extLst>
-              <a:ext uri="{FF2B5EF4-FFF2-40B4-BE49-F238E27FC236}">
-                <a16:creationId xmlns:a16="http://schemas.microsoft.com/office/drawing/2014/main" id="{A2C66165-7369-3E4C-8A94-1E512BD01E33}"/>
+          <p:cNvPr id="10" name="Strzałka: w prawo 11">
+            <a:extLst>
+              <a:ext uri="{FF2B5EF4-FFF2-40B4-BE49-F238E27FC236}">
+                <a16:creationId xmlns:a16="http://schemas.microsoft.com/office/drawing/2014/main" id="{3E1672A3-1652-BA47-ADC2-A823FE0EC80E}"/>
               </a:ext>
             </a:extLst>
           </p:cNvPr>
@@ -4910,8 +5750,8 @@
         </p:nvSpPr>
         <p:spPr>
           <a:xfrm>
-            <a:off x="5078183" y="3383835"/>
-            <a:ext cx="1776925" cy="461665"/>
+            <a:off x="5464098" y="3516848"/>
+            <a:ext cx="1215482" cy="461665"/>
           </a:xfrm>
           <a:prstGeom prst="rightArrow">
             <a:avLst/>
@@ -4944,10 +5784,10 @@
       </p:sp>
       <p:pic>
         <p:nvPicPr>
-          <p:cNvPr id="14" name="Obraz 13">
-            <a:extLst>
-              <a:ext uri="{FF2B5EF4-FFF2-40B4-BE49-F238E27FC236}">
-                <a16:creationId xmlns:a16="http://schemas.microsoft.com/office/drawing/2014/main" id="{7C06355B-82AC-EB49-BCBF-C814BA6942CF}"/>
+          <p:cNvPr id="11" name="Obraz 10">
+            <a:extLst>
+              <a:ext uri="{FF2B5EF4-FFF2-40B4-BE49-F238E27FC236}">
+                <a16:creationId xmlns:a16="http://schemas.microsoft.com/office/drawing/2014/main" id="{628D301A-2B18-7F4E-8F6B-D89522C3EBA6}"/>
               </a:ext>
             </a:extLst>
           </p:cNvPr>
@@ -4957,7 +5797,7 @@
           <p:nvPr/>
         </p:nvPicPr>
         <p:blipFill>
-          <a:blip r:embed="rId3">
+          <a:blip r:embed="rId4">
             <a:extLst>
               <a:ext uri="{28A0092B-C50C-407E-A947-70E740481C1C}">
                 <a14:useLocalDpi xmlns:a14="http://schemas.microsoft.com/office/drawing/2010/main" val="0"/>
@@ -4970,20 +5810,39 @@
         </p:blipFill>
         <p:spPr>
           <a:xfrm>
-            <a:off x="838200" y="2592022"/>
-            <a:ext cx="3636069" cy="2045289"/>
+            <a:off x="838200" y="2482424"/>
+            <a:ext cx="4498691" cy="2530514"/>
           </a:xfrm>
           <a:prstGeom prst="roundRect">
-            <a:avLst/>
+            <a:avLst>
+              <a:gd name="adj" fmla="val 11111"/>
+            </a:avLst>
           </a:prstGeom>
+          <a:ln w="190500" cap="rnd">
+            <a:solidFill>
+              <a:srgbClr val="C8C6BD"/>
+            </a:solidFill>
+            <a:prstDash val="solid"/>
+          </a:ln>
           <a:effectLst>
-            <a:outerShdw blurRad="50800" dist="38100" dir="2700000" algn="tl" rotWithShape="0">
-              <a:prstClr val="black">
-                <a:alpha val="40000"/>
-              </a:prstClr>
+            <a:outerShdw blurRad="101600" dist="50800" dir="7200000" algn="tl" rotWithShape="0">
+              <a:srgbClr val="000000">
+                <a:alpha val="45000"/>
+              </a:srgbClr>
             </a:outerShdw>
-            <a:softEdge rad="0"/>
           </a:effectLst>
+          <a:scene3d>
+            <a:camera prst="perspectiveFront" fov="5400000"/>
+            <a:lightRig rig="threePt" dir="t">
+              <a:rot lat="0" lon="0" rev="19200000"/>
+            </a:lightRig>
+          </a:scene3d>
+          <a:sp3d extrusionH="25400">
+            <a:bevelT w="304800" h="152400" prst="hardEdge"/>
+            <a:extrusionClr>
+              <a:srgbClr val="FFFFFF"/>
+            </a:extrusionClr>
+          </a:sp3d>
         </p:spPr>
       </p:pic>
     </p:spTree>
@@ -5061,7 +5920,7 @@
           </p:nvPr>
         </p:nvPicPr>
         <p:blipFill>
-          <a:blip r:embed="rId2">
+          <a:blip r:embed="rId3">
             <a:extLst>
               <a:ext uri="{28A0092B-C50C-407E-A947-70E740481C1C}">
                 <a14:useLocalDpi xmlns:a14="http://schemas.microsoft.com/office/drawing/2010/main" val="0"/>
@@ -5077,6 +5936,36 @@
             <a:off x="6855108" y="1690688"/>
             <a:ext cx="4498692" cy="2530514"/>
           </a:xfrm>
+          <a:prstGeom prst="roundRect">
+            <a:avLst>
+              <a:gd name="adj" fmla="val 11111"/>
+            </a:avLst>
+          </a:prstGeom>
+          <a:ln w="190500" cap="rnd">
+            <a:solidFill>
+              <a:srgbClr val="C8C6BD"/>
+            </a:solidFill>
+            <a:prstDash val="solid"/>
+          </a:ln>
+          <a:effectLst>
+            <a:outerShdw blurRad="101600" dist="50800" dir="7200000" algn="tl" rotWithShape="0">
+              <a:srgbClr val="000000">
+                <a:alpha val="45000"/>
+              </a:srgbClr>
+            </a:outerShdw>
+          </a:effectLst>
+          <a:scene3d>
+            <a:camera prst="perspectiveFront" fov="5400000"/>
+            <a:lightRig rig="threePt" dir="t">
+              <a:rot lat="0" lon="0" rev="19200000"/>
+            </a:lightRig>
+          </a:scene3d>
+          <a:sp3d extrusionH="25400">
+            <a:bevelT w="304800" h="152400" prst="hardEdge"/>
+            <a:extrusionClr>
+              <a:srgbClr val="FFFFFF"/>
+            </a:extrusionClr>
+          </a:sp3d>
         </p:spPr>
       </p:pic>
       <p:sp>
@@ -5093,8 +5982,8 @@
         </p:nvSpPr>
         <p:spPr>
           <a:xfrm>
-            <a:off x="5078183" y="2725112"/>
-            <a:ext cx="1776925" cy="461665"/>
+            <a:off x="5464098" y="2725112"/>
+            <a:ext cx="1215482" cy="461665"/>
           </a:xfrm>
           <a:prstGeom prst="rightArrow">
             <a:avLst/>
@@ -5140,7 +6029,7 @@
           <p:nvPr/>
         </p:nvPicPr>
         <p:blipFill>
-          <a:blip r:embed="rId3">
+          <a:blip r:embed="rId4">
             <a:extLst>
               <a:ext uri="{28A0092B-C50C-407E-A947-70E740481C1C}">
                 <a14:useLocalDpi xmlns:a14="http://schemas.microsoft.com/office/drawing/2010/main" val="0"/>
@@ -5153,20 +6042,39 @@
         </p:blipFill>
         <p:spPr>
           <a:xfrm>
-            <a:off x="838200" y="1933299"/>
-            <a:ext cx="3636069" cy="2045289"/>
+            <a:off x="838200" y="1690688"/>
+            <a:ext cx="4498691" cy="2530514"/>
           </a:xfrm>
           <a:prstGeom prst="roundRect">
-            <a:avLst/>
+            <a:avLst>
+              <a:gd name="adj" fmla="val 11111"/>
+            </a:avLst>
           </a:prstGeom>
+          <a:ln w="190500" cap="rnd">
+            <a:solidFill>
+              <a:srgbClr val="C8C6BD"/>
+            </a:solidFill>
+            <a:prstDash val="solid"/>
+          </a:ln>
           <a:effectLst>
-            <a:outerShdw blurRad="50800" dist="38100" dir="2700000" algn="tl" rotWithShape="0">
-              <a:prstClr val="black">
-                <a:alpha val="40000"/>
-              </a:prstClr>
+            <a:outerShdw blurRad="101600" dist="50800" dir="7200000" algn="tl" rotWithShape="0">
+              <a:srgbClr val="000000">
+                <a:alpha val="45000"/>
+              </a:srgbClr>
             </a:outerShdw>
-            <a:softEdge rad="0"/>
           </a:effectLst>
+          <a:scene3d>
+            <a:camera prst="perspectiveFront" fov="5400000"/>
+            <a:lightRig rig="threePt" dir="t">
+              <a:rot lat="0" lon="0" rev="19200000"/>
+            </a:lightRig>
+          </a:scene3d>
+          <a:sp3d extrusionH="25400">
+            <a:bevelT w="304800" h="152400" prst="hardEdge"/>
+            <a:extrusionClr>
+              <a:srgbClr val="FFFFFF"/>
+            </a:extrusionClr>
+          </a:sp3d>
         </p:spPr>
       </p:pic>
       <p:sp>
@@ -5183,7 +6091,7 @@
         </p:nvSpPr>
         <p:spPr>
           <a:xfrm rot="5400000">
-            <a:off x="8605272" y="4246936"/>
+            <a:off x="8605271" y="4734877"/>
             <a:ext cx="998361" cy="461665"/>
           </a:xfrm>
           <a:prstGeom prst="rightArrow">
@@ -5229,7 +6137,7 @@
         </p:nvSpPr>
         <p:spPr>
           <a:xfrm>
-            <a:off x="7137889" y="5085100"/>
+            <a:off x="7137888" y="5375031"/>
             <a:ext cx="3933128" cy="923330"/>
           </a:xfrm>
           <a:prstGeom prst="rect">
@@ -5477,8 +6385,8 @@
           </a:p>
         </p:txBody>
       </p:sp>
-      <mc:AlternateContent xmlns:mc="http://schemas.openxmlformats.org/markup-compatibility/2006" xmlns:am3d="http://schemas.microsoft.com/office/drawing/2017/model3d">
-        <mc:Choice Requires="am3d">
+      <mc:AlternateContent xmlns:mc="http://schemas.openxmlformats.org/markup-compatibility/2006">
+        <mc:Choice xmlns="" xmlns:am3d="http://schemas.microsoft.com/office/drawing/2017/model3d" Requires="am3d">
           <p:graphicFrame>
             <p:nvGraphicFramePr>
               <p:cNvPr id="4" name="Symbol zastępczy zawartości 3" descr="Dark Gray Cube">
@@ -5505,7 +6413,7 @@
             </p:xfrm>
             <a:graphic>
               <a:graphicData uri="http://schemas.microsoft.com/office/drawing/2017/model3d">
-                <am3d:model3d r:embed="rId2">
+                <am3d:model3d r:embed="rId3">
                   <am3d:spPr>
                     <a:xfrm>
                       <a:off x="0" y="0"/>
@@ -5532,9 +6440,9 @@
                     <am3d:rot ax="2457929" ay="2235546" az="1663670"/>
                     <am3d:postTrans dx="0" dy="0" dz="0"/>
                   </am3d:trans>
-                  <am3d:attrSrcUrl r:id="rId3"/>
+                  <am3d:attrSrcUrl r:id="rId4"/>
                   <am3d:raster rName="Office3DRenderer" rVer="16.0.8326">
-                    <am3d:blip r:embed="rId4"/>
+                    <am3d:blip r:embed="rId5"/>
                   </am3d:raster>
                   <am3d:objViewport viewportSz="2644617"/>
                   <am3d:ambientLight>
@@ -5569,13 +6477,13 @@
             </a:graphic>
           </p:graphicFrame>
         </mc:Choice>
-        <mc:Fallback xmlns="">
+        <mc:Fallback>
           <p:pic>
             <p:nvPicPr>
               <p:cNvPr id="4" name="Symbol zastępczy zawartości 3" descr="Dark Gray Cube">
                 <a:extLst>
                   <a:ext uri="{FF2B5EF4-FFF2-40B4-BE49-F238E27FC236}">
-                    <a16:creationId xmlns:a16="http://schemas.microsoft.com/office/drawing/2014/main" xmlns="" id="{C60A8F24-E8D9-4335-9BC2-710D119A7A79}"/>
+                    <a16:creationId xmlns:a16="http://schemas.microsoft.com/office/drawing/2014/main" id="{C60A8F24-E8D9-4335-9BC2-710D119A7A79}"/>
                   </a:ext>
                 </a:extLst>
               </p:cNvPr>
@@ -5585,7 +6493,7 @@
               <p:nvPr/>
             </p:nvPicPr>
             <p:blipFill>
-              <a:blip r:embed="rId5" cstate="print"/>
+              <a:blip r:embed="rId6" cstate="print"/>
               <a:stretch>
                 <a:fillRect/>
               </a:stretch>
@@ -5848,8 +6756,8 @@
           </a:p>
         </p:txBody>
       </p:sp>
-      <mc:AlternateContent xmlns:mc="http://schemas.openxmlformats.org/markup-compatibility/2006" xmlns:am3d="http://schemas.microsoft.com/office/drawing/2017/model3d">
-        <mc:Choice Requires="am3d">
+      <mc:AlternateContent xmlns:mc="http://schemas.openxmlformats.org/markup-compatibility/2006">
+        <mc:Choice xmlns="" xmlns:am3d="http://schemas.microsoft.com/office/drawing/2017/model3d" Requires="am3d">
           <p:graphicFrame>
             <p:nvGraphicFramePr>
               <p:cNvPr id="9" name="Symbol zastępczy zawartości 3" descr="Dark Gray Cube">
@@ -5877,7 +6785,7 @@
             </p:xfrm>
             <a:graphic>
               <a:graphicData uri="http://schemas.microsoft.com/office/drawing/2017/model3d">
-                <am3d:model3d r:embed="rId2">
+                <am3d:model3d r:embed="rId3">
                   <am3d:spPr>
                     <a:xfrm>
                       <a:off x="0" y="0"/>
@@ -5904,9 +6812,9 @@
                     <am3d:rot ax="2457929" ay="2235546" az="1663670"/>
                     <am3d:postTrans dx="0" dy="0" dz="0"/>
                   </am3d:trans>
-                  <am3d:attrSrcUrl r:id="rId3"/>
+                  <am3d:attrSrcUrl r:id="rId4"/>
                   <am3d:raster rName="Office3DRenderer" rVer="16.0.8326">
-                    <am3d:blip r:embed="rId4"/>
+                    <am3d:blip r:embed="rId5"/>
                   </am3d:raster>
                   <am3d:objViewport viewportSz="2644617"/>
                   <am3d:ambientLight>
@@ -5941,13 +6849,13 @@
             </a:graphic>
           </p:graphicFrame>
         </mc:Choice>
-        <mc:Fallback xmlns="">
+        <mc:Fallback>
           <p:pic>
             <p:nvPicPr>
               <p:cNvPr id="9" name="Symbol zastępczy zawartości 3" descr="Dark Gray Cube">
                 <a:extLst>
                   <a:ext uri="{FF2B5EF4-FFF2-40B4-BE49-F238E27FC236}">
-                    <a16:creationId xmlns:a16="http://schemas.microsoft.com/office/drawing/2014/main" xmlns="" id="{D8D561D0-5298-466E-92A5-03AB4EE327D1}"/>
+                    <a16:creationId xmlns:a16="http://schemas.microsoft.com/office/drawing/2014/main" id="{D8D561D0-5298-466E-92A5-03AB4EE327D1}"/>
                   </a:ext>
                 </a:extLst>
               </p:cNvPr>
@@ -5957,7 +6865,7 @@
               <p:nvPr/>
             </p:nvPicPr>
             <p:blipFill>
-              <a:blip r:embed="rId5" cstate="print"/>
+              <a:blip r:embed="rId6" cstate="print"/>
               <a:stretch>
                 <a:fillRect/>
               </a:stretch>
@@ -6220,8 +7128,8 @@
           </a:p>
         </p:txBody>
       </p:sp>
-      <mc:AlternateContent xmlns:mc="http://schemas.openxmlformats.org/markup-compatibility/2006" xmlns:am3d="http://schemas.microsoft.com/office/drawing/2017/model3d">
-        <mc:Choice Requires="am3d">
+      <mc:AlternateContent xmlns:mc="http://schemas.openxmlformats.org/markup-compatibility/2006">
+        <mc:Choice xmlns="" xmlns:am3d="http://schemas.microsoft.com/office/drawing/2017/model3d" Requires="am3d">
           <p:graphicFrame>
             <p:nvGraphicFramePr>
               <p:cNvPr id="4" name="Symbol zastępczy zawartości 3" descr="Dark Gray Cube">
@@ -6312,13 +7220,13 @@
             </a:graphic>
           </p:graphicFrame>
         </mc:Choice>
-        <mc:Fallback xmlns="">
+        <mc:Fallback>
           <p:pic>
             <p:nvPicPr>
               <p:cNvPr id="4" name="Symbol zastępczy zawartości 3" descr="Dark Gray Cube">
                 <a:extLst>
                   <a:ext uri="{FF2B5EF4-FFF2-40B4-BE49-F238E27FC236}">
-                    <a16:creationId xmlns:a16="http://schemas.microsoft.com/office/drawing/2014/main" xmlns="" id="{8B030970-781B-49BF-8457-31D987DAD2F3}"/>
+                    <a16:creationId xmlns:a16="http://schemas.microsoft.com/office/drawing/2014/main" id="{8B030970-781B-49BF-8457-31D987DAD2F3}"/>
                   </a:ext>
                 </a:extLst>
               </p:cNvPr>
@@ -6919,13 +7827,13 @@
           </p:nvPr>
         </p:nvPicPr>
         <p:blipFill>
-          <a:blip r:embed="rId2" cstate="print">
+          <a:blip r:embed="rId3" cstate="print">
             <a:extLst>
               <a:ext uri="{28A0092B-C50C-407E-A947-70E740481C1C}">
                 <a14:useLocalDpi xmlns:a14="http://schemas.microsoft.com/office/drawing/2010/main" val="0"/>
               </a:ext>
               <a:ext uri="{837473B0-CC2E-450A-ABE3-18F120FF3D39}">
-                <a1611:picAttrSrcUrl xmlns:a1611="http://schemas.microsoft.com/office/drawing/2016/11/main" r:id="rId3"/>
+                <a1611:picAttrSrcUrl xmlns:a1611="http://schemas.microsoft.com/office/drawing/2016/11/main" r:id="rId4"/>
               </a:ext>
             </a:extLst>
           </a:blip>
@@ -7339,8 +8247,8 @@
           </a:p>
         </p:txBody>
       </p:sp>
-      <mc:AlternateContent xmlns:mc="http://schemas.openxmlformats.org/markup-compatibility/2006" xmlns:am3d="http://schemas.microsoft.com/office/drawing/2017/model3d">
-        <mc:Choice Requires="am3d">
+      <mc:AlternateContent xmlns:mc="http://schemas.openxmlformats.org/markup-compatibility/2006">
+        <mc:Choice xmlns="" xmlns:am3d="http://schemas.microsoft.com/office/drawing/2017/model3d" Requires="am3d">
           <p:graphicFrame>
             <p:nvGraphicFramePr>
               <p:cNvPr id="9" name="Symbol zastępczy zawartości 3" descr="Dark Gray Cube">
@@ -7368,7 +8276,7 @@
             </p:xfrm>
             <a:graphic>
               <a:graphicData uri="http://schemas.microsoft.com/office/drawing/2017/model3d">
-                <am3d:model3d r:embed="rId2">
+                <am3d:model3d r:embed="rId3">
                   <am3d:spPr>
                     <a:xfrm>
                       <a:off x="0" y="0"/>
@@ -7395,9 +8303,9 @@
                     <am3d:rot ax="2457929" ay="2235546" az="1663670"/>
                     <am3d:postTrans dx="0" dy="0" dz="0"/>
                   </am3d:trans>
-                  <am3d:attrSrcUrl r:id="rId3"/>
+                  <am3d:attrSrcUrl r:id="rId4"/>
                   <am3d:raster rName="Office3DRenderer" rVer="16.0.8326">
-                    <am3d:blip r:embed="rId4"/>
+                    <am3d:blip r:embed="rId5"/>
                   </am3d:raster>
                   <am3d:objViewport viewportSz="2644617"/>
                   <am3d:ambientLight>
@@ -7432,13 +8340,13 @@
             </a:graphic>
           </p:graphicFrame>
         </mc:Choice>
-        <mc:Fallback xmlns="">
+        <mc:Fallback>
           <p:pic>
             <p:nvPicPr>
               <p:cNvPr id="9" name="Symbol zastępczy zawartości 3" descr="Dark Gray Cube">
                 <a:extLst>
                   <a:ext uri="{FF2B5EF4-FFF2-40B4-BE49-F238E27FC236}">
-                    <a16:creationId xmlns:a16="http://schemas.microsoft.com/office/drawing/2014/main" xmlns="" id="{D8D561D0-5298-466E-92A5-03AB4EE327D1}"/>
+                    <a16:creationId xmlns:a16="http://schemas.microsoft.com/office/drawing/2014/main" id="{D8D561D0-5298-466E-92A5-03AB4EE327D1}"/>
                   </a:ext>
                 </a:extLst>
               </p:cNvPr>
@@ -7448,7 +8356,7 @@
               <p:nvPr/>
             </p:nvPicPr>
             <p:blipFill>
-              <a:blip r:embed="rId5" cstate="print"/>
+              <a:blip r:embed="rId6" cstate="print"/>
               <a:stretch>
                 <a:fillRect/>
               </a:stretch>

</xml_diff>